<commit_message>
Presentazione con effetti grafici e i nostri nomi
</commit_message>
<xml_diff>
--- a/PresentazioneGit.pptx
+++ b/PresentazioneGit.pptx
@@ -9,7 +9,8 @@
     <p:sldId id="258" r:id="rId3"/>
     <p:sldId id="259" r:id="rId4"/>
     <p:sldId id="260" r:id="rId5"/>
-    <p:sldId id="261" r:id="rId6"/>
+    <p:sldId id="262" r:id="rId6"/>
+    <p:sldId id="261" r:id="rId7"/>
   </p:sldIdLst>
   <p:sldSz cx="12192000" cy="6858000"/>
   <p:notesSz cx="6858000" cy="9144000"/>
@@ -17,94 +18,124 @@
     <a:defPPr>
       <a:defRPr lang="it-IT"/>
     </a:defPPr>
-    <a:lvl1pPr marL="0" algn="l" defTabSz="914400" rtl="0" eaLnBrk="1" latinLnBrk="0" hangingPunct="1">
-      <a:defRPr sz="1800" kern="1200">
+    <a:lvl1pPr algn="l" rtl="0" fontAlgn="base">
+      <a:spcBef>
+        <a:spcPct val="0"/>
+      </a:spcBef>
+      <a:spcAft>
+        <a:spcPct val="0"/>
+      </a:spcAft>
+      <a:defRPr kern="1200">
         <a:solidFill>
           <a:schemeClr val="tx1"/>
         </a:solidFill>
-        <a:latin typeface="+mn-lt"/>
+        <a:latin typeface="Arial" charset="0"/>
         <a:ea typeface="+mn-ea"/>
-        <a:cs typeface="+mn-cs"/>
+        <a:cs typeface="Arial" charset="0"/>
       </a:defRPr>
     </a:lvl1pPr>
-    <a:lvl2pPr marL="457200" algn="l" defTabSz="914400" rtl="0" eaLnBrk="1" latinLnBrk="0" hangingPunct="1">
-      <a:defRPr sz="1800" kern="1200">
+    <a:lvl2pPr marL="457200" algn="l" rtl="0" fontAlgn="base">
+      <a:spcBef>
+        <a:spcPct val="0"/>
+      </a:spcBef>
+      <a:spcAft>
+        <a:spcPct val="0"/>
+      </a:spcAft>
+      <a:defRPr kern="1200">
         <a:solidFill>
           <a:schemeClr val="tx1"/>
         </a:solidFill>
-        <a:latin typeface="+mn-lt"/>
+        <a:latin typeface="Arial" charset="0"/>
         <a:ea typeface="+mn-ea"/>
-        <a:cs typeface="+mn-cs"/>
+        <a:cs typeface="Arial" charset="0"/>
       </a:defRPr>
     </a:lvl2pPr>
-    <a:lvl3pPr marL="914400" algn="l" defTabSz="914400" rtl="0" eaLnBrk="1" latinLnBrk="0" hangingPunct="1">
-      <a:defRPr sz="1800" kern="1200">
+    <a:lvl3pPr marL="914400" algn="l" rtl="0" fontAlgn="base">
+      <a:spcBef>
+        <a:spcPct val="0"/>
+      </a:spcBef>
+      <a:spcAft>
+        <a:spcPct val="0"/>
+      </a:spcAft>
+      <a:defRPr kern="1200">
         <a:solidFill>
           <a:schemeClr val="tx1"/>
         </a:solidFill>
-        <a:latin typeface="+mn-lt"/>
+        <a:latin typeface="Arial" charset="0"/>
         <a:ea typeface="+mn-ea"/>
-        <a:cs typeface="+mn-cs"/>
+        <a:cs typeface="Arial" charset="0"/>
       </a:defRPr>
     </a:lvl3pPr>
-    <a:lvl4pPr marL="1371600" algn="l" defTabSz="914400" rtl="0" eaLnBrk="1" latinLnBrk="0" hangingPunct="1">
-      <a:defRPr sz="1800" kern="1200">
+    <a:lvl4pPr marL="1371600" algn="l" rtl="0" fontAlgn="base">
+      <a:spcBef>
+        <a:spcPct val="0"/>
+      </a:spcBef>
+      <a:spcAft>
+        <a:spcPct val="0"/>
+      </a:spcAft>
+      <a:defRPr kern="1200">
         <a:solidFill>
           <a:schemeClr val="tx1"/>
         </a:solidFill>
-        <a:latin typeface="+mn-lt"/>
+        <a:latin typeface="Arial" charset="0"/>
         <a:ea typeface="+mn-ea"/>
-        <a:cs typeface="+mn-cs"/>
+        <a:cs typeface="Arial" charset="0"/>
       </a:defRPr>
     </a:lvl4pPr>
-    <a:lvl5pPr marL="1828800" algn="l" defTabSz="914400" rtl="0" eaLnBrk="1" latinLnBrk="0" hangingPunct="1">
-      <a:defRPr sz="1800" kern="1200">
+    <a:lvl5pPr marL="1828800" algn="l" rtl="0" fontAlgn="base">
+      <a:spcBef>
+        <a:spcPct val="0"/>
+      </a:spcBef>
+      <a:spcAft>
+        <a:spcPct val="0"/>
+      </a:spcAft>
+      <a:defRPr kern="1200">
         <a:solidFill>
           <a:schemeClr val="tx1"/>
         </a:solidFill>
-        <a:latin typeface="+mn-lt"/>
+        <a:latin typeface="Arial" charset="0"/>
         <a:ea typeface="+mn-ea"/>
-        <a:cs typeface="+mn-cs"/>
+        <a:cs typeface="Arial" charset="0"/>
       </a:defRPr>
     </a:lvl5pPr>
     <a:lvl6pPr marL="2286000" algn="l" defTabSz="914400" rtl="0" eaLnBrk="1" latinLnBrk="0" hangingPunct="1">
-      <a:defRPr sz="1800" kern="1200">
+      <a:defRPr kern="1200">
         <a:solidFill>
           <a:schemeClr val="tx1"/>
         </a:solidFill>
-        <a:latin typeface="+mn-lt"/>
+        <a:latin typeface="Arial" charset="0"/>
         <a:ea typeface="+mn-ea"/>
-        <a:cs typeface="+mn-cs"/>
+        <a:cs typeface="Arial" charset="0"/>
       </a:defRPr>
     </a:lvl6pPr>
     <a:lvl7pPr marL="2743200" algn="l" defTabSz="914400" rtl="0" eaLnBrk="1" latinLnBrk="0" hangingPunct="1">
-      <a:defRPr sz="1800" kern="1200">
+      <a:defRPr kern="1200">
         <a:solidFill>
           <a:schemeClr val="tx1"/>
         </a:solidFill>
-        <a:latin typeface="+mn-lt"/>
+        <a:latin typeface="Arial" charset="0"/>
         <a:ea typeface="+mn-ea"/>
-        <a:cs typeface="+mn-cs"/>
+        <a:cs typeface="Arial" charset="0"/>
       </a:defRPr>
     </a:lvl7pPr>
     <a:lvl8pPr marL="3200400" algn="l" defTabSz="914400" rtl="0" eaLnBrk="1" latinLnBrk="0" hangingPunct="1">
-      <a:defRPr sz="1800" kern="1200">
+      <a:defRPr kern="1200">
         <a:solidFill>
           <a:schemeClr val="tx1"/>
         </a:solidFill>
-        <a:latin typeface="+mn-lt"/>
+        <a:latin typeface="Arial" charset="0"/>
         <a:ea typeface="+mn-ea"/>
-        <a:cs typeface="+mn-cs"/>
+        <a:cs typeface="Arial" charset="0"/>
       </a:defRPr>
     </a:lvl8pPr>
     <a:lvl9pPr marL="3657600" algn="l" defTabSz="914400" rtl="0" eaLnBrk="1" latinLnBrk="0" hangingPunct="1">
-      <a:defRPr sz="1800" kern="1200">
+      <a:defRPr kern="1200">
         <a:solidFill>
           <a:schemeClr val="tx1"/>
         </a:solidFill>
-        <a:latin typeface="+mn-lt"/>
+        <a:latin typeface="Arial" charset="0"/>
         <a:ea typeface="+mn-ea"/>
-        <a:cs typeface="+mn-cs"/>
+        <a:cs typeface="Arial" charset="0"/>
       </a:defRPr>
     </a:lvl9pPr>
   </p:defaultTextStyle>
@@ -238,11 +269,21 @@
         <p:spPr/>
         <p:txBody>
           <a:bodyPr/>
-          <a:lstStyle/>
-          <a:p>
-            <a:fld id="{31FED824-DF94-4EB2-B72D-3AE4F3945764}" type="datetimeFigureOut">
-              <a:rPr lang="it-IT" smtClean="0"/>
-              <a:t>11/05/2016</a:t>
+          <a:lstStyle>
+            <a:lvl1pPr>
+              <a:defRPr/>
+            </a:lvl1pPr>
+          </a:lstStyle>
+          <a:p>
+            <a:pPr>
+              <a:defRPr/>
+            </a:pPr>
+            <a:fld id="{45CF627F-9916-4A6A-BD02-F48A6FE947F9}" type="datetimeFigureOut">
+              <a:rPr lang="it-IT"/>
+              <a:pPr>
+                <a:defRPr/>
+              </a:pPr>
+              <a:t>12/05/2016</a:t>
             </a:fld>
             <a:endParaRPr lang="it-IT"/>
           </a:p>
@@ -261,8 +302,15 @@
         <p:spPr/>
         <p:txBody>
           <a:bodyPr/>
-          <a:lstStyle/>
-          <a:p>
+          <a:lstStyle>
+            <a:lvl1pPr>
+              <a:defRPr/>
+            </a:lvl1pPr>
+          </a:lstStyle>
+          <a:p>
+            <a:pPr>
+              <a:defRPr/>
+            </a:pPr>
             <a:endParaRPr lang="it-IT"/>
           </a:p>
         </p:txBody>
@@ -280,10 +328,20 @@
         <p:spPr/>
         <p:txBody>
           <a:bodyPr/>
-          <a:lstStyle/>
-          <a:p>
-            <a:fld id="{E113ED2B-B0E0-4998-8A95-15A3C81222DB}" type="slidenum">
-              <a:rPr lang="it-IT" smtClean="0"/>
+          <a:lstStyle>
+            <a:lvl1pPr>
+              <a:defRPr/>
+            </a:lvl1pPr>
+          </a:lstStyle>
+          <a:p>
+            <a:pPr>
+              <a:defRPr/>
+            </a:pPr>
+            <a:fld id="{686A8391-FD53-4FD5-BEF4-3D7C533009D1}" type="slidenum">
+              <a:rPr lang="it-IT"/>
+              <a:pPr>
+                <a:defRPr/>
+              </a:pPr>
               <a:t>‹N›</a:t>
             </a:fld>
             <a:endParaRPr lang="it-IT"/>
@@ -291,11 +349,6 @@
         </p:txBody>
       </p:sp>
     </p:spTree>
-    <p:extLst>
-      <p:ext uri="{BB962C8B-B14F-4D97-AF65-F5344CB8AC3E}">
-        <p14:creationId xmlns:p14="http://schemas.microsoft.com/office/powerpoint/2010/main" val="404749065"/>
-      </p:ext>
-    </p:extLst>
   </p:cSld>
   <p:clrMapOvr>
     <a:masterClrMapping/>
@@ -408,11 +461,21 @@
         <p:spPr/>
         <p:txBody>
           <a:bodyPr/>
-          <a:lstStyle/>
-          <a:p>
-            <a:fld id="{31FED824-DF94-4EB2-B72D-3AE4F3945764}" type="datetimeFigureOut">
-              <a:rPr lang="it-IT" smtClean="0"/>
-              <a:t>11/05/2016</a:t>
+          <a:lstStyle>
+            <a:lvl1pPr>
+              <a:defRPr/>
+            </a:lvl1pPr>
+          </a:lstStyle>
+          <a:p>
+            <a:pPr>
+              <a:defRPr/>
+            </a:pPr>
+            <a:fld id="{D72295D4-7E53-4116-A6CC-E21115F59B9F}" type="datetimeFigureOut">
+              <a:rPr lang="it-IT"/>
+              <a:pPr>
+                <a:defRPr/>
+              </a:pPr>
+              <a:t>12/05/2016</a:t>
             </a:fld>
             <a:endParaRPr lang="it-IT"/>
           </a:p>
@@ -431,8 +494,15 @@
         <p:spPr/>
         <p:txBody>
           <a:bodyPr/>
-          <a:lstStyle/>
-          <a:p>
+          <a:lstStyle>
+            <a:lvl1pPr>
+              <a:defRPr/>
+            </a:lvl1pPr>
+          </a:lstStyle>
+          <a:p>
+            <a:pPr>
+              <a:defRPr/>
+            </a:pPr>
             <a:endParaRPr lang="it-IT"/>
           </a:p>
         </p:txBody>
@@ -450,10 +520,20 @@
         <p:spPr/>
         <p:txBody>
           <a:bodyPr/>
-          <a:lstStyle/>
-          <a:p>
-            <a:fld id="{E113ED2B-B0E0-4998-8A95-15A3C81222DB}" type="slidenum">
-              <a:rPr lang="it-IT" smtClean="0"/>
+          <a:lstStyle>
+            <a:lvl1pPr>
+              <a:defRPr/>
+            </a:lvl1pPr>
+          </a:lstStyle>
+          <a:p>
+            <a:pPr>
+              <a:defRPr/>
+            </a:pPr>
+            <a:fld id="{C37E6F2B-37ED-4AEB-8963-9390AEBEF5DE}" type="slidenum">
+              <a:rPr lang="it-IT"/>
+              <a:pPr>
+                <a:defRPr/>
+              </a:pPr>
               <a:t>‹N›</a:t>
             </a:fld>
             <a:endParaRPr lang="it-IT"/>
@@ -461,11 +541,6 @@
         </p:txBody>
       </p:sp>
     </p:spTree>
-    <p:extLst>
-      <p:ext uri="{BB962C8B-B14F-4D97-AF65-F5344CB8AC3E}">
-        <p14:creationId xmlns:p14="http://schemas.microsoft.com/office/powerpoint/2010/main" val="405622517"/>
-      </p:ext>
-    </p:extLst>
   </p:cSld>
   <p:clrMapOvr>
     <a:masterClrMapping/>
@@ -588,11 +663,21 @@
         <p:spPr/>
         <p:txBody>
           <a:bodyPr/>
-          <a:lstStyle/>
-          <a:p>
-            <a:fld id="{31FED824-DF94-4EB2-B72D-3AE4F3945764}" type="datetimeFigureOut">
-              <a:rPr lang="it-IT" smtClean="0"/>
-              <a:t>11/05/2016</a:t>
+          <a:lstStyle>
+            <a:lvl1pPr>
+              <a:defRPr/>
+            </a:lvl1pPr>
+          </a:lstStyle>
+          <a:p>
+            <a:pPr>
+              <a:defRPr/>
+            </a:pPr>
+            <a:fld id="{367A8A57-F035-4136-AE79-92D3F07C34DE}" type="datetimeFigureOut">
+              <a:rPr lang="it-IT"/>
+              <a:pPr>
+                <a:defRPr/>
+              </a:pPr>
+              <a:t>12/05/2016</a:t>
             </a:fld>
             <a:endParaRPr lang="it-IT"/>
           </a:p>
@@ -611,8 +696,15 @@
         <p:spPr/>
         <p:txBody>
           <a:bodyPr/>
-          <a:lstStyle/>
-          <a:p>
+          <a:lstStyle>
+            <a:lvl1pPr>
+              <a:defRPr/>
+            </a:lvl1pPr>
+          </a:lstStyle>
+          <a:p>
+            <a:pPr>
+              <a:defRPr/>
+            </a:pPr>
             <a:endParaRPr lang="it-IT"/>
           </a:p>
         </p:txBody>
@@ -630,10 +722,20 @@
         <p:spPr/>
         <p:txBody>
           <a:bodyPr/>
-          <a:lstStyle/>
-          <a:p>
-            <a:fld id="{E113ED2B-B0E0-4998-8A95-15A3C81222DB}" type="slidenum">
-              <a:rPr lang="it-IT" smtClean="0"/>
+          <a:lstStyle>
+            <a:lvl1pPr>
+              <a:defRPr/>
+            </a:lvl1pPr>
+          </a:lstStyle>
+          <a:p>
+            <a:pPr>
+              <a:defRPr/>
+            </a:pPr>
+            <a:fld id="{579090B8-1D42-47D5-B691-1C8EB0F0309A}" type="slidenum">
+              <a:rPr lang="it-IT"/>
+              <a:pPr>
+                <a:defRPr/>
+              </a:pPr>
               <a:t>‹N›</a:t>
             </a:fld>
             <a:endParaRPr lang="it-IT"/>
@@ -641,11 +743,6 @@
         </p:txBody>
       </p:sp>
     </p:spTree>
-    <p:extLst>
-      <p:ext uri="{BB962C8B-B14F-4D97-AF65-F5344CB8AC3E}">
-        <p14:creationId xmlns:p14="http://schemas.microsoft.com/office/powerpoint/2010/main" val="3699112224"/>
-      </p:ext>
-    </p:extLst>
   </p:cSld>
   <p:clrMapOvr>
     <a:masterClrMapping/>
@@ -758,11 +855,21 @@
         <p:spPr/>
         <p:txBody>
           <a:bodyPr/>
-          <a:lstStyle/>
-          <a:p>
-            <a:fld id="{31FED824-DF94-4EB2-B72D-3AE4F3945764}" type="datetimeFigureOut">
-              <a:rPr lang="it-IT" smtClean="0"/>
-              <a:t>11/05/2016</a:t>
+          <a:lstStyle>
+            <a:lvl1pPr>
+              <a:defRPr/>
+            </a:lvl1pPr>
+          </a:lstStyle>
+          <a:p>
+            <a:pPr>
+              <a:defRPr/>
+            </a:pPr>
+            <a:fld id="{7FAC9B66-9D79-49AB-B8B9-EFAC27C366BE}" type="datetimeFigureOut">
+              <a:rPr lang="it-IT"/>
+              <a:pPr>
+                <a:defRPr/>
+              </a:pPr>
+              <a:t>12/05/2016</a:t>
             </a:fld>
             <a:endParaRPr lang="it-IT"/>
           </a:p>
@@ -781,8 +888,15 @@
         <p:spPr/>
         <p:txBody>
           <a:bodyPr/>
-          <a:lstStyle/>
-          <a:p>
+          <a:lstStyle>
+            <a:lvl1pPr>
+              <a:defRPr/>
+            </a:lvl1pPr>
+          </a:lstStyle>
+          <a:p>
+            <a:pPr>
+              <a:defRPr/>
+            </a:pPr>
             <a:endParaRPr lang="it-IT"/>
           </a:p>
         </p:txBody>
@@ -800,10 +914,20 @@
         <p:spPr/>
         <p:txBody>
           <a:bodyPr/>
-          <a:lstStyle/>
-          <a:p>
-            <a:fld id="{E113ED2B-B0E0-4998-8A95-15A3C81222DB}" type="slidenum">
-              <a:rPr lang="it-IT" smtClean="0"/>
+          <a:lstStyle>
+            <a:lvl1pPr>
+              <a:defRPr/>
+            </a:lvl1pPr>
+          </a:lstStyle>
+          <a:p>
+            <a:pPr>
+              <a:defRPr/>
+            </a:pPr>
+            <a:fld id="{01A93D50-E623-463F-94C8-D9422A30D3B1}" type="slidenum">
+              <a:rPr lang="it-IT"/>
+              <a:pPr>
+                <a:defRPr/>
+              </a:pPr>
               <a:t>‹N›</a:t>
             </a:fld>
             <a:endParaRPr lang="it-IT"/>
@@ -811,11 +935,6 @@
         </p:txBody>
       </p:sp>
     </p:spTree>
-    <p:extLst>
-      <p:ext uri="{BB962C8B-B14F-4D97-AF65-F5344CB8AC3E}">
-        <p14:creationId xmlns:p14="http://schemas.microsoft.com/office/powerpoint/2010/main" val="567769752"/>
-      </p:ext>
-    </p:extLst>
   </p:cSld>
   <p:clrMapOvr>
     <a:masterClrMapping/>
@@ -1004,11 +1123,21 @@
         <p:spPr/>
         <p:txBody>
           <a:bodyPr/>
-          <a:lstStyle/>
-          <a:p>
-            <a:fld id="{31FED824-DF94-4EB2-B72D-3AE4F3945764}" type="datetimeFigureOut">
-              <a:rPr lang="it-IT" smtClean="0"/>
-              <a:t>11/05/2016</a:t>
+          <a:lstStyle>
+            <a:lvl1pPr>
+              <a:defRPr/>
+            </a:lvl1pPr>
+          </a:lstStyle>
+          <a:p>
+            <a:pPr>
+              <a:defRPr/>
+            </a:pPr>
+            <a:fld id="{A2A644F3-626A-4251-9FE5-6ABAB64F689D}" type="datetimeFigureOut">
+              <a:rPr lang="it-IT"/>
+              <a:pPr>
+                <a:defRPr/>
+              </a:pPr>
+              <a:t>12/05/2016</a:t>
             </a:fld>
             <a:endParaRPr lang="it-IT"/>
           </a:p>
@@ -1027,8 +1156,15 @@
         <p:spPr/>
         <p:txBody>
           <a:bodyPr/>
-          <a:lstStyle/>
-          <a:p>
+          <a:lstStyle>
+            <a:lvl1pPr>
+              <a:defRPr/>
+            </a:lvl1pPr>
+          </a:lstStyle>
+          <a:p>
+            <a:pPr>
+              <a:defRPr/>
+            </a:pPr>
             <a:endParaRPr lang="it-IT"/>
           </a:p>
         </p:txBody>
@@ -1046,10 +1182,20 @@
         <p:spPr/>
         <p:txBody>
           <a:bodyPr/>
-          <a:lstStyle/>
-          <a:p>
-            <a:fld id="{E113ED2B-B0E0-4998-8A95-15A3C81222DB}" type="slidenum">
-              <a:rPr lang="it-IT" smtClean="0"/>
+          <a:lstStyle>
+            <a:lvl1pPr>
+              <a:defRPr/>
+            </a:lvl1pPr>
+          </a:lstStyle>
+          <a:p>
+            <a:pPr>
+              <a:defRPr/>
+            </a:pPr>
+            <a:fld id="{CC201756-0D6F-4CFC-AB38-2B78B393AC49}" type="slidenum">
+              <a:rPr lang="it-IT"/>
+              <a:pPr>
+                <a:defRPr/>
+              </a:pPr>
               <a:t>‹N›</a:t>
             </a:fld>
             <a:endParaRPr lang="it-IT"/>
@@ -1057,11 +1203,6 @@
         </p:txBody>
       </p:sp>
     </p:spTree>
-    <p:extLst>
-      <p:ext uri="{BB962C8B-B14F-4D97-AF65-F5344CB8AC3E}">
-        <p14:creationId xmlns:p14="http://schemas.microsoft.com/office/powerpoint/2010/main" val="1664292921"/>
-      </p:ext>
-    </p:extLst>
   </p:cSld>
   <p:clrMapOvr>
     <a:masterClrMapping/>
@@ -1225,7 +1366,7 @@
       </p:sp>
       <p:sp>
         <p:nvSpPr>
-          <p:cNvPr id="5" name="Segnaposto data 4"/>
+          <p:cNvPr id="5" name="Segnaposto data 3"/>
           <p:cNvSpPr>
             <a:spLocks noGrp="1"/>
           </p:cNvSpPr>
@@ -1236,11 +1377,21 @@
         <p:spPr/>
         <p:txBody>
           <a:bodyPr/>
-          <a:lstStyle/>
-          <a:p>
-            <a:fld id="{31FED824-DF94-4EB2-B72D-3AE4F3945764}" type="datetimeFigureOut">
-              <a:rPr lang="it-IT" smtClean="0"/>
-              <a:t>11/05/2016</a:t>
+          <a:lstStyle>
+            <a:lvl1pPr>
+              <a:defRPr/>
+            </a:lvl1pPr>
+          </a:lstStyle>
+          <a:p>
+            <a:pPr>
+              <a:defRPr/>
+            </a:pPr>
+            <a:fld id="{97D12703-2C22-4477-99F5-D8D4D88AB39C}" type="datetimeFigureOut">
+              <a:rPr lang="it-IT"/>
+              <a:pPr>
+                <a:defRPr/>
+              </a:pPr>
+              <a:t>12/05/2016</a:t>
             </a:fld>
             <a:endParaRPr lang="it-IT"/>
           </a:p>
@@ -1248,7 +1399,7 @@
       </p:sp>
       <p:sp>
         <p:nvSpPr>
-          <p:cNvPr id="6" name="Segnaposto piè di pagina 5"/>
+          <p:cNvPr id="6" name="Segnaposto piè di pagina 4"/>
           <p:cNvSpPr>
             <a:spLocks noGrp="1"/>
           </p:cNvSpPr>
@@ -1259,15 +1410,22 @@
         <p:spPr/>
         <p:txBody>
           <a:bodyPr/>
-          <a:lstStyle/>
-          <a:p>
+          <a:lstStyle>
+            <a:lvl1pPr>
+              <a:defRPr/>
+            </a:lvl1pPr>
+          </a:lstStyle>
+          <a:p>
+            <a:pPr>
+              <a:defRPr/>
+            </a:pPr>
             <a:endParaRPr lang="it-IT"/>
           </a:p>
         </p:txBody>
       </p:sp>
       <p:sp>
         <p:nvSpPr>
-          <p:cNvPr id="7" name="Segnaposto numero diapositiva 6"/>
+          <p:cNvPr id="7" name="Segnaposto numero diapositiva 5"/>
           <p:cNvSpPr>
             <a:spLocks noGrp="1"/>
           </p:cNvSpPr>
@@ -1278,10 +1436,20 @@
         <p:spPr/>
         <p:txBody>
           <a:bodyPr/>
-          <a:lstStyle/>
-          <a:p>
-            <a:fld id="{E113ED2B-B0E0-4998-8A95-15A3C81222DB}" type="slidenum">
-              <a:rPr lang="it-IT" smtClean="0"/>
+          <a:lstStyle>
+            <a:lvl1pPr>
+              <a:defRPr/>
+            </a:lvl1pPr>
+          </a:lstStyle>
+          <a:p>
+            <a:pPr>
+              <a:defRPr/>
+            </a:pPr>
+            <a:fld id="{FCFA4E3D-38F0-4AB7-98E2-1282BF88CC2D}" type="slidenum">
+              <a:rPr lang="it-IT"/>
+              <a:pPr>
+                <a:defRPr/>
+              </a:pPr>
               <a:t>‹N›</a:t>
             </a:fld>
             <a:endParaRPr lang="it-IT"/>
@@ -1289,11 +1457,6 @@
         </p:txBody>
       </p:sp>
     </p:spTree>
-    <p:extLst>
-      <p:ext uri="{BB962C8B-B14F-4D97-AF65-F5344CB8AC3E}">
-        <p14:creationId xmlns:p14="http://schemas.microsoft.com/office/powerpoint/2010/main" val="3268423679"/>
-      </p:ext>
-    </p:extLst>
   </p:cSld>
   <p:clrMapOvr>
     <a:masterClrMapping/>
@@ -1592,7 +1755,7 @@
       </p:sp>
       <p:sp>
         <p:nvSpPr>
-          <p:cNvPr id="7" name="Segnaposto data 6"/>
+          <p:cNvPr id="7" name="Segnaposto data 3"/>
           <p:cNvSpPr>
             <a:spLocks noGrp="1"/>
           </p:cNvSpPr>
@@ -1603,11 +1766,21 @@
         <p:spPr/>
         <p:txBody>
           <a:bodyPr/>
-          <a:lstStyle/>
-          <a:p>
-            <a:fld id="{31FED824-DF94-4EB2-B72D-3AE4F3945764}" type="datetimeFigureOut">
-              <a:rPr lang="it-IT" smtClean="0"/>
-              <a:t>11/05/2016</a:t>
+          <a:lstStyle>
+            <a:lvl1pPr>
+              <a:defRPr/>
+            </a:lvl1pPr>
+          </a:lstStyle>
+          <a:p>
+            <a:pPr>
+              <a:defRPr/>
+            </a:pPr>
+            <a:fld id="{D523CF88-368E-49CF-8004-471AD52300DB}" type="datetimeFigureOut">
+              <a:rPr lang="it-IT"/>
+              <a:pPr>
+                <a:defRPr/>
+              </a:pPr>
+              <a:t>12/05/2016</a:t>
             </a:fld>
             <a:endParaRPr lang="it-IT"/>
           </a:p>
@@ -1615,7 +1788,7 @@
       </p:sp>
       <p:sp>
         <p:nvSpPr>
-          <p:cNvPr id="8" name="Segnaposto piè di pagina 7"/>
+          <p:cNvPr id="8" name="Segnaposto piè di pagina 4"/>
           <p:cNvSpPr>
             <a:spLocks noGrp="1"/>
           </p:cNvSpPr>
@@ -1626,15 +1799,22 @@
         <p:spPr/>
         <p:txBody>
           <a:bodyPr/>
-          <a:lstStyle/>
-          <a:p>
+          <a:lstStyle>
+            <a:lvl1pPr>
+              <a:defRPr/>
+            </a:lvl1pPr>
+          </a:lstStyle>
+          <a:p>
+            <a:pPr>
+              <a:defRPr/>
+            </a:pPr>
             <a:endParaRPr lang="it-IT"/>
           </a:p>
         </p:txBody>
       </p:sp>
       <p:sp>
         <p:nvSpPr>
-          <p:cNvPr id="9" name="Segnaposto numero diapositiva 8"/>
+          <p:cNvPr id="9" name="Segnaposto numero diapositiva 5"/>
           <p:cNvSpPr>
             <a:spLocks noGrp="1"/>
           </p:cNvSpPr>
@@ -1645,10 +1825,20 @@
         <p:spPr/>
         <p:txBody>
           <a:bodyPr/>
-          <a:lstStyle/>
-          <a:p>
-            <a:fld id="{E113ED2B-B0E0-4998-8A95-15A3C81222DB}" type="slidenum">
-              <a:rPr lang="it-IT" smtClean="0"/>
+          <a:lstStyle>
+            <a:lvl1pPr>
+              <a:defRPr/>
+            </a:lvl1pPr>
+          </a:lstStyle>
+          <a:p>
+            <a:pPr>
+              <a:defRPr/>
+            </a:pPr>
+            <a:fld id="{0D91631B-D497-4C56-ACE1-AEEDAF7D8E5B}" type="slidenum">
+              <a:rPr lang="it-IT"/>
+              <a:pPr>
+                <a:defRPr/>
+              </a:pPr>
               <a:t>‹N›</a:t>
             </a:fld>
             <a:endParaRPr lang="it-IT"/>
@@ -1656,11 +1846,6 @@
         </p:txBody>
       </p:sp>
     </p:spTree>
-    <p:extLst>
-      <p:ext uri="{BB962C8B-B14F-4D97-AF65-F5344CB8AC3E}">
-        <p14:creationId xmlns:p14="http://schemas.microsoft.com/office/powerpoint/2010/main" val="3192329756"/>
-      </p:ext>
-    </p:extLst>
   </p:cSld>
   <p:clrMapOvr>
     <a:masterClrMapping/>
@@ -1710,7 +1895,7 @@
       </p:sp>
       <p:sp>
         <p:nvSpPr>
-          <p:cNvPr id="3" name="Segnaposto data 2"/>
+          <p:cNvPr id="3" name="Segnaposto data 3"/>
           <p:cNvSpPr>
             <a:spLocks noGrp="1"/>
           </p:cNvSpPr>
@@ -1721,11 +1906,21 @@
         <p:spPr/>
         <p:txBody>
           <a:bodyPr/>
-          <a:lstStyle/>
-          <a:p>
-            <a:fld id="{31FED824-DF94-4EB2-B72D-3AE4F3945764}" type="datetimeFigureOut">
-              <a:rPr lang="it-IT" smtClean="0"/>
-              <a:t>11/05/2016</a:t>
+          <a:lstStyle>
+            <a:lvl1pPr>
+              <a:defRPr/>
+            </a:lvl1pPr>
+          </a:lstStyle>
+          <a:p>
+            <a:pPr>
+              <a:defRPr/>
+            </a:pPr>
+            <a:fld id="{9679E992-7855-4FDC-A737-D6599ED1061D}" type="datetimeFigureOut">
+              <a:rPr lang="it-IT"/>
+              <a:pPr>
+                <a:defRPr/>
+              </a:pPr>
+              <a:t>12/05/2016</a:t>
             </a:fld>
             <a:endParaRPr lang="it-IT"/>
           </a:p>
@@ -1733,7 +1928,7 @@
       </p:sp>
       <p:sp>
         <p:nvSpPr>
-          <p:cNvPr id="4" name="Segnaposto piè di pagina 3"/>
+          <p:cNvPr id="4" name="Segnaposto piè di pagina 4"/>
           <p:cNvSpPr>
             <a:spLocks noGrp="1"/>
           </p:cNvSpPr>
@@ -1744,15 +1939,22 @@
         <p:spPr/>
         <p:txBody>
           <a:bodyPr/>
-          <a:lstStyle/>
-          <a:p>
+          <a:lstStyle>
+            <a:lvl1pPr>
+              <a:defRPr/>
+            </a:lvl1pPr>
+          </a:lstStyle>
+          <a:p>
+            <a:pPr>
+              <a:defRPr/>
+            </a:pPr>
             <a:endParaRPr lang="it-IT"/>
           </a:p>
         </p:txBody>
       </p:sp>
       <p:sp>
         <p:nvSpPr>
-          <p:cNvPr id="5" name="Segnaposto numero diapositiva 4"/>
+          <p:cNvPr id="5" name="Segnaposto numero diapositiva 5"/>
           <p:cNvSpPr>
             <a:spLocks noGrp="1"/>
           </p:cNvSpPr>
@@ -1763,10 +1965,20 @@
         <p:spPr/>
         <p:txBody>
           <a:bodyPr/>
-          <a:lstStyle/>
-          <a:p>
-            <a:fld id="{E113ED2B-B0E0-4998-8A95-15A3C81222DB}" type="slidenum">
-              <a:rPr lang="it-IT" smtClean="0"/>
+          <a:lstStyle>
+            <a:lvl1pPr>
+              <a:defRPr/>
+            </a:lvl1pPr>
+          </a:lstStyle>
+          <a:p>
+            <a:pPr>
+              <a:defRPr/>
+            </a:pPr>
+            <a:fld id="{F0DD4CD4-F31D-4038-BF69-6646E692F0E2}" type="slidenum">
+              <a:rPr lang="it-IT"/>
+              <a:pPr>
+                <a:defRPr/>
+              </a:pPr>
               <a:t>‹N›</a:t>
             </a:fld>
             <a:endParaRPr lang="it-IT"/>
@@ -1774,11 +1986,6 @@
         </p:txBody>
       </p:sp>
     </p:spTree>
-    <p:extLst>
-      <p:ext uri="{BB962C8B-B14F-4D97-AF65-F5344CB8AC3E}">
-        <p14:creationId xmlns:p14="http://schemas.microsoft.com/office/powerpoint/2010/main" val="653717752"/>
-      </p:ext>
-    </p:extLst>
   </p:cSld>
   <p:clrMapOvr>
     <a:masterClrMapping/>
@@ -1805,7 +2012,7 @@
       </p:grpSpPr>
       <p:sp>
         <p:nvSpPr>
-          <p:cNvPr id="2" name="Segnaposto data 1"/>
+          <p:cNvPr id="2" name="Segnaposto data 3"/>
           <p:cNvSpPr>
             <a:spLocks noGrp="1"/>
           </p:cNvSpPr>
@@ -1816,11 +2023,21 @@
         <p:spPr/>
         <p:txBody>
           <a:bodyPr/>
-          <a:lstStyle/>
-          <a:p>
-            <a:fld id="{31FED824-DF94-4EB2-B72D-3AE4F3945764}" type="datetimeFigureOut">
-              <a:rPr lang="it-IT" smtClean="0"/>
-              <a:t>11/05/2016</a:t>
+          <a:lstStyle>
+            <a:lvl1pPr>
+              <a:defRPr/>
+            </a:lvl1pPr>
+          </a:lstStyle>
+          <a:p>
+            <a:pPr>
+              <a:defRPr/>
+            </a:pPr>
+            <a:fld id="{FFD84C42-EFF0-4982-8FC4-C096295BB53E}" type="datetimeFigureOut">
+              <a:rPr lang="it-IT"/>
+              <a:pPr>
+                <a:defRPr/>
+              </a:pPr>
+              <a:t>12/05/2016</a:t>
             </a:fld>
             <a:endParaRPr lang="it-IT"/>
           </a:p>
@@ -1828,7 +2045,7 @@
       </p:sp>
       <p:sp>
         <p:nvSpPr>
-          <p:cNvPr id="3" name="Segnaposto piè di pagina 2"/>
+          <p:cNvPr id="3" name="Segnaposto piè di pagina 4"/>
           <p:cNvSpPr>
             <a:spLocks noGrp="1"/>
           </p:cNvSpPr>
@@ -1839,15 +2056,22 @@
         <p:spPr/>
         <p:txBody>
           <a:bodyPr/>
-          <a:lstStyle/>
-          <a:p>
+          <a:lstStyle>
+            <a:lvl1pPr>
+              <a:defRPr/>
+            </a:lvl1pPr>
+          </a:lstStyle>
+          <a:p>
+            <a:pPr>
+              <a:defRPr/>
+            </a:pPr>
             <a:endParaRPr lang="it-IT"/>
           </a:p>
         </p:txBody>
       </p:sp>
       <p:sp>
         <p:nvSpPr>
-          <p:cNvPr id="4" name="Segnaposto numero diapositiva 3"/>
+          <p:cNvPr id="4" name="Segnaposto numero diapositiva 5"/>
           <p:cNvSpPr>
             <a:spLocks noGrp="1"/>
           </p:cNvSpPr>
@@ -1858,10 +2082,20 @@
         <p:spPr/>
         <p:txBody>
           <a:bodyPr/>
-          <a:lstStyle/>
-          <a:p>
-            <a:fld id="{E113ED2B-B0E0-4998-8A95-15A3C81222DB}" type="slidenum">
-              <a:rPr lang="it-IT" smtClean="0"/>
+          <a:lstStyle>
+            <a:lvl1pPr>
+              <a:defRPr/>
+            </a:lvl1pPr>
+          </a:lstStyle>
+          <a:p>
+            <a:pPr>
+              <a:defRPr/>
+            </a:pPr>
+            <a:fld id="{62D6F9AD-5357-4B65-8D8B-BF424B3D9122}" type="slidenum">
+              <a:rPr lang="it-IT"/>
+              <a:pPr>
+                <a:defRPr/>
+              </a:pPr>
               <a:t>‹N›</a:t>
             </a:fld>
             <a:endParaRPr lang="it-IT"/>
@@ -1869,11 +2103,6 @@
         </p:txBody>
       </p:sp>
     </p:spTree>
-    <p:extLst>
-      <p:ext uri="{BB962C8B-B14F-4D97-AF65-F5344CB8AC3E}">
-        <p14:creationId xmlns:p14="http://schemas.microsoft.com/office/powerpoint/2010/main" val="4028388619"/>
-      </p:ext>
-    </p:extLst>
   </p:cSld>
   <p:clrMapOvr>
     <a:masterClrMapping/>
@@ -2082,7 +2311,7 @@
       </p:sp>
       <p:sp>
         <p:nvSpPr>
-          <p:cNvPr id="5" name="Segnaposto data 4"/>
+          <p:cNvPr id="5" name="Segnaposto data 3"/>
           <p:cNvSpPr>
             <a:spLocks noGrp="1"/>
           </p:cNvSpPr>
@@ -2093,11 +2322,21 @@
         <p:spPr/>
         <p:txBody>
           <a:bodyPr/>
-          <a:lstStyle/>
-          <a:p>
-            <a:fld id="{31FED824-DF94-4EB2-B72D-3AE4F3945764}" type="datetimeFigureOut">
-              <a:rPr lang="it-IT" smtClean="0"/>
-              <a:t>11/05/2016</a:t>
+          <a:lstStyle>
+            <a:lvl1pPr>
+              <a:defRPr/>
+            </a:lvl1pPr>
+          </a:lstStyle>
+          <a:p>
+            <a:pPr>
+              <a:defRPr/>
+            </a:pPr>
+            <a:fld id="{778377D4-A57F-46C6-8C4A-91B271037ED8}" type="datetimeFigureOut">
+              <a:rPr lang="it-IT"/>
+              <a:pPr>
+                <a:defRPr/>
+              </a:pPr>
+              <a:t>12/05/2016</a:t>
             </a:fld>
             <a:endParaRPr lang="it-IT"/>
           </a:p>
@@ -2105,7 +2344,7 @@
       </p:sp>
       <p:sp>
         <p:nvSpPr>
-          <p:cNvPr id="6" name="Segnaposto piè di pagina 5"/>
+          <p:cNvPr id="6" name="Segnaposto piè di pagina 4"/>
           <p:cNvSpPr>
             <a:spLocks noGrp="1"/>
           </p:cNvSpPr>
@@ -2116,15 +2355,22 @@
         <p:spPr/>
         <p:txBody>
           <a:bodyPr/>
-          <a:lstStyle/>
-          <a:p>
+          <a:lstStyle>
+            <a:lvl1pPr>
+              <a:defRPr/>
+            </a:lvl1pPr>
+          </a:lstStyle>
+          <a:p>
+            <a:pPr>
+              <a:defRPr/>
+            </a:pPr>
             <a:endParaRPr lang="it-IT"/>
           </a:p>
         </p:txBody>
       </p:sp>
       <p:sp>
         <p:nvSpPr>
-          <p:cNvPr id="7" name="Segnaposto numero diapositiva 6"/>
+          <p:cNvPr id="7" name="Segnaposto numero diapositiva 5"/>
           <p:cNvSpPr>
             <a:spLocks noGrp="1"/>
           </p:cNvSpPr>
@@ -2135,10 +2381,20 @@
         <p:spPr/>
         <p:txBody>
           <a:bodyPr/>
-          <a:lstStyle/>
-          <a:p>
-            <a:fld id="{E113ED2B-B0E0-4998-8A95-15A3C81222DB}" type="slidenum">
-              <a:rPr lang="it-IT" smtClean="0"/>
+          <a:lstStyle>
+            <a:lvl1pPr>
+              <a:defRPr/>
+            </a:lvl1pPr>
+          </a:lstStyle>
+          <a:p>
+            <a:pPr>
+              <a:defRPr/>
+            </a:pPr>
+            <a:fld id="{D58C6FCB-014F-4DB0-BE67-F36AB59D5BD4}" type="slidenum">
+              <a:rPr lang="it-IT"/>
+              <a:pPr>
+                <a:defRPr/>
+              </a:pPr>
               <a:t>‹N›</a:t>
             </a:fld>
             <a:endParaRPr lang="it-IT"/>
@@ -2146,11 +2402,6 @@
         </p:txBody>
       </p:sp>
     </p:spTree>
-    <p:extLst>
-      <p:ext uri="{BB962C8B-B14F-4D97-AF65-F5344CB8AC3E}">
-        <p14:creationId xmlns:p14="http://schemas.microsoft.com/office/powerpoint/2010/main" val="3135554698"/>
-      </p:ext>
-    </p:extLst>
   </p:cSld>
   <p:clrMapOvr>
     <a:masterClrMapping/>
@@ -2224,7 +2475,9 @@
           </a:xfrm>
         </p:spPr>
         <p:txBody>
-          <a:bodyPr/>
+          <a:bodyPr rtlCol="0">
+            <a:normAutofit/>
+          </a:bodyPr>
           <a:lstStyle>
             <a:lvl1pPr marL="0" indent="0">
               <a:buNone/>
@@ -2264,7 +2517,8 @@
             </a:lvl9pPr>
           </a:lstStyle>
           <a:p>
-            <a:endParaRPr lang="it-IT"/>
+            <a:pPr lvl="0"/>
+            <a:endParaRPr lang="it-IT" noProof="0"/>
           </a:p>
         </p:txBody>
       </p:sp>
@@ -2335,7 +2589,7 @@
       </p:sp>
       <p:sp>
         <p:nvSpPr>
-          <p:cNvPr id="5" name="Segnaposto data 4"/>
+          <p:cNvPr id="5" name="Segnaposto data 3"/>
           <p:cNvSpPr>
             <a:spLocks noGrp="1"/>
           </p:cNvSpPr>
@@ -2346,11 +2600,21 @@
         <p:spPr/>
         <p:txBody>
           <a:bodyPr/>
-          <a:lstStyle/>
-          <a:p>
-            <a:fld id="{31FED824-DF94-4EB2-B72D-3AE4F3945764}" type="datetimeFigureOut">
-              <a:rPr lang="it-IT" smtClean="0"/>
-              <a:t>11/05/2016</a:t>
+          <a:lstStyle>
+            <a:lvl1pPr>
+              <a:defRPr/>
+            </a:lvl1pPr>
+          </a:lstStyle>
+          <a:p>
+            <a:pPr>
+              <a:defRPr/>
+            </a:pPr>
+            <a:fld id="{BE4928A9-C318-45EE-A60D-4809155E8BE8}" type="datetimeFigureOut">
+              <a:rPr lang="it-IT"/>
+              <a:pPr>
+                <a:defRPr/>
+              </a:pPr>
+              <a:t>12/05/2016</a:t>
             </a:fld>
             <a:endParaRPr lang="it-IT"/>
           </a:p>
@@ -2358,7 +2622,7 @@
       </p:sp>
       <p:sp>
         <p:nvSpPr>
-          <p:cNvPr id="6" name="Segnaposto piè di pagina 5"/>
+          <p:cNvPr id="6" name="Segnaposto piè di pagina 4"/>
           <p:cNvSpPr>
             <a:spLocks noGrp="1"/>
           </p:cNvSpPr>
@@ -2369,15 +2633,22 @@
         <p:spPr/>
         <p:txBody>
           <a:bodyPr/>
-          <a:lstStyle/>
-          <a:p>
+          <a:lstStyle>
+            <a:lvl1pPr>
+              <a:defRPr/>
+            </a:lvl1pPr>
+          </a:lstStyle>
+          <a:p>
+            <a:pPr>
+              <a:defRPr/>
+            </a:pPr>
             <a:endParaRPr lang="it-IT"/>
           </a:p>
         </p:txBody>
       </p:sp>
       <p:sp>
         <p:nvSpPr>
-          <p:cNvPr id="7" name="Segnaposto numero diapositiva 6"/>
+          <p:cNvPr id="7" name="Segnaposto numero diapositiva 5"/>
           <p:cNvSpPr>
             <a:spLocks noGrp="1"/>
           </p:cNvSpPr>
@@ -2388,10 +2659,20 @@
         <p:spPr/>
         <p:txBody>
           <a:bodyPr/>
-          <a:lstStyle/>
-          <a:p>
-            <a:fld id="{E113ED2B-B0E0-4998-8A95-15A3C81222DB}" type="slidenum">
-              <a:rPr lang="it-IT" smtClean="0"/>
+          <a:lstStyle>
+            <a:lvl1pPr>
+              <a:defRPr/>
+            </a:lvl1pPr>
+          </a:lstStyle>
+          <a:p>
+            <a:pPr>
+              <a:defRPr/>
+            </a:pPr>
+            <a:fld id="{05957AC5-AF90-4565-B6E4-2B207F19B5B7}" type="slidenum">
+              <a:rPr lang="it-IT"/>
+              <a:pPr>
+                <a:defRPr/>
+              </a:pPr>
               <a:t>‹N›</a:t>
             </a:fld>
             <a:endParaRPr lang="it-IT"/>
@@ -2399,11 +2680,6 @@
         </p:txBody>
       </p:sp>
     </p:spTree>
-    <p:extLst>
-      <p:ext uri="{BB962C8B-B14F-4D97-AF65-F5344CB8AC3E}">
-        <p14:creationId xmlns:p14="http://schemas.microsoft.com/office/powerpoint/2010/main" val="240072260"/>
-      </p:ext>
-    </p:extLst>
   </p:cSld>
   <p:clrMapOvr>
     <a:masterClrMapping/>
@@ -2435,7 +2711,7 @@
       </p:grpSpPr>
       <p:sp>
         <p:nvSpPr>
-          <p:cNvPr id="2" name="Segnaposto titolo 1"/>
+          <p:cNvPr id="1026" name="Segnaposto titolo 1"/>
           <p:cNvSpPr>
             <a:spLocks noGrp="1"/>
           </p:cNvSpPr>
@@ -2443,7 +2719,7 @@
             <p:ph type="title"/>
           </p:nvPr>
         </p:nvSpPr>
-        <p:spPr>
+        <p:spPr bwMode="auto">
           <a:xfrm>
             <a:off x="838200" y="365125"/>
             <a:ext cx="10515600" cy="1325563"/>
@@ -2451,24 +2727,33 @@
           <a:prstGeom prst="rect">
             <a:avLst/>
           </a:prstGeom>
+          <a:noFill/>
+          <a:ln w="9525">
+            <a:noFill/>
+            <a:miter lim="800000"/>
+            <a:headEnd/>
+            <a:tailEnd/>
+          </a:ln>
         </p:spPr>
         <p:txBody>
-          <a:bodyPr vert="horz" lIns="91440" tIns="45720" rIns="91440" bIns="45720" rtlCol="0" anchor="ctr">
-            <a:normAutofit/>
+          <a:bodyPr vert="horz" wrap="square" lIns="91440" tIns="45720" rIns="91440" bIns="45720" numCol="1" anchor="ctr" anchorCtr="0" compatLnSpc="1">
+            <a:prstTxWarp prst="textNoShape">
+              <a:avLst/>
+            </a:prstTxWarp>
           </a:bodyPr>
           <a:lstStyle/>
           <a:p>
+            <a:pPr lvl="0"/>
             <a:r>
               <a:rPr lang="it-IT" smtClean="0"/>
               <a:t>Fare clic per modificare lo stile del titolo</a:t>
             </a:r>
-            <a:endParaRPr lang="it-IT"/>
-          </a:p>
-        </p:txBody>
-      </p:sp>
-      <p:sp>
-        <p:nvSpPr>
-          <p:cNvPr id="3" name="Segnaposto testo 2"/>
+          </a:p>
+        </p:txBody>
+      </p:sp>
+      <p:sp>
+        <p:nvSpPr>
+          <p:cNvPr id="1027" name="Segnaposto testo 2"/>
           <p:cNvSpPr>
             <a:spLocks noGrp="1"/>
           </p:cNvSpPr>
@@ -2476,7 +2761,7 @@
             <p:ph type="body" idx="1"/>
           </p:nvPr>
         </p:nvSpPr>
-        <p:spPr>
+        <p:spPr bwMode="auto">
           <a:xfrm>
             <a:off x="838200" y="1825625"/>
             <a:ext cx="10515600" cy="4351338"/>
@@ -2484,10 +2769,19 @@
           <a:prstGeom prst="rect">
             <a:avLst/>
           </a:prstGeom>
+          <a:noFill/>
+          <a:ln w="9525">
+            <a:noFill/>
+            <a:miter lim="800000"/>
+            <a:headEnd/>
+            <a:tailEnd/>
+          </a:ln>
         </p:spPr>
         <p:txBody>
-          <a:bodyPr vert="horz" lIns="91440" tIns="45720" rIns="91440" bIns="45720" rtlCol="0">
-            <a:normAutofit/>
+          <a:bodyPr vert="horz" wrap="square" lIns="91440" tIns="45720" rIns="91440" bIns="45720" numCol="1" anchor="t" anchorCtr="0" compatLnSpc="1">
+            <a:prstTxWarp prst="textNoShape">
+              <a:avLst/>
+            </a:prstTxWarp>
           </a:bodyPr>
           <a:lstStyle/>
           <a:p>
@@ -2524,7 +2818,6 @@
               <a:rPr lang="it-IT" smtClean="0"/>
               <a:t>Quinto livello</a:t>
             </a:r>
-            <a:endParaRPr lang="it-IT"/>
           </a:p>
         </p:txBody>
       </p:sp>
@@ -2550,20 +2843,34 @@
         <p:txBody>
           <a:bodyPr vert="horz" lIns="91440" tIns="45720" rIns="91440" bIns="45720" rtlCol="0" anchor="ctr"/>
           <a:lstStyle>
-            <a:lvl1pPr algn="l">
-              <a:defRPr sz="1200">
+            <a:lvl1pPr algn="l" fontAlgn="auto">
+              <a:spcBef>
+                <a:spcPts val="0"/>
+              </a:spcBef>
+              <a:spcAft>
+                <a:spcPts val="0"/>
+              </a:spcAft>
+              <a:defRPr sz="1200" smtClean="0">
                 <a:solidFill>
                   <a:schemeClr val="tx1">
                     <a:tint val="75000"/>
                   </a:schemeClr>
                 </a:solidFill>
+                <a:latin typeface="+mn-lt"/>
+                <a:cs typeface="+mn-cs"/>
               </a:defRPr>
             </a:lvl1pPr>
           </a:lstStyle>
           <a:p>
-            <a:fld id="{31FED824-DF94-4EB2-B72D-3AE4F3945764}" type="datetimeFigureOut">
-              <a:rPr lang="it-IT" smtClean="0"/>
-              <a:t>11/05/2016</a:t>
+            <a:pPr>
+              <a:defRPr/>
+            </a:pPr>
+            <a:fld id="{2A0DBFAB-7DCF-4646-B49B-6670E346C0F2}" type="datetimeFigureOut">
+              <a:rPr lang="it-IT"/>
+              <a:pPr>
+                <a:defRPr/>
+              </a:pPr>
+              <a:t>12/05/2016</a:t>
             </a:fld>
             <a:endParaRPr lang="it-IT"/>
           </a:p>
@@ -2591,17 +2898,28 @@
         <p:txBody>
           <a:bodyPr vert="horz" lIns="91440" tIns="45720" rIns="91440" bIns="45720" rtlCol="0" anchor="ctr"/>
           <a:lstStyle>
-            <a:lvl1pPr algn="ctr">
+            <a:lvl1pPr algn="ctr" fontAlgn="auto">
+              <a:spcBef>
+                <a:spcPts val="0"/>
+              </a:spcBef>
+              <a:spcAft>
+                <a:spcPts val="0"/>
+              </a:spcAft>
               <a:defRPr sz="1200">
                 <a:solidFill>
                   <a:schemeClr val="tx1">
                     <a:tint val="75000"/>
                   </a:schemeClr>
                 </a:solidFill>
+                <a:latin typeface="+mn-lt"/>
+                <a:cs typeface="+mn-cs"/>
               </a:defRPr>
             </a:lvl1pPr>
           </a:lstStyle>
           <a:p>
+            <a:pPr>
+              <a:defRPr/>
+            </a:pPr>
             <a:endParaRPr lang="it-IT"/>
           </a:p>
         </p:txBody>
@@ -2628,19 +2946,33 @@
         <p:txBody>
           <a:bodyPr vert="horz" lIns="91440" tIns="45720" rIns="91440" bIns="45720" rtlCol="0" anchor="ctr"/>
           <a:lstStyle>
-            <a:lvl1pPr algn="r">
-              <a:defRPr sz="1200">
+            <a:lvl1pPr algn="r" fontAlgn="auto">
+              <a:spcBef>
+                <a:spcPts val="0"/>
+              </a:spcBef>
+              <a:spcAft>
+                <a:spcPts val="0"/>
+              </a:spcAft>
+              <a:defRPr sz="1200" smtClean="0">
                 <a:solidFill>
                   <a:schemeClr val="tx1">
                     <a:tint val="75000"/>
                   </a:schemeClr>
                 </a:solidFill>
+                <a:latin typeface="+mn-lt"/>
+                <a:cs typeface="+mn-cs"/>
               </a:defRPr>
             </a:lvl1pPr>
           </a:lstStyle>
           <a:p>
-            <a:fld id="{E113ED2B-B0E0-4998-8A95-15A3C81222DB}" type="slidenum">
-              <a:rPr lang="it-IT" smtClean="0"/>
+            <a:pPr>
+              <a:defRPr/>
+            </a:pPr>
+            <a:fld id="{CC5F5C78-F339-45C2-AA70-BBA33B073E87}" type="slidenum">
+              <a:rPr lang="it-IT"/>
+              <a:pPr>
+                <a:defRPr/>
+              </a:pPr>
               <a:t>‹N›</a:t>
             </a:fld>
             <a:endParaRPr lang="it-IT"/>
@@ -2648,11 +2980,6 @@
         </p:txBody>
       </p:sp>
     </p:spTree>
-    <p:extLst>
-      <p:ext uri="{BB962C8B-B14F-4D97-AF65-F5344CB8AC3E}">
-        <p14:creationId xmlns:p14="http://schemas.microsoft.com/office/powerpoint/2010/main" val="215740784"/>
-      </p:ext>
-    </p:extLst>
   </p:cSld>
   <p:clrMap bg1="lt1" tx1="dk1" bg2="lt2" tx2="dk2" accent1="accent1" accent2="accent2" accent3="accent3" accent4="accent4" accent5="accent5" accent6="accent6" hlink="hlink" folHlink="folHlink"/>
   <p:sldLayoutIdLst>
@@ -2670,14 +2997,16 @@
   </p:sldLayoutIdLst>
   <p:txStyles>
     <p:titleStyle>
-      <a:lvl1pPr algn="l" defTabSz="914400" rtl="0" eaLnBrk="1" latinLnBrk="0" hangingPunct="1">
+      <a:lvl1pPr algn="l" rtl="0" fontAlgn="base">
         <a:lnSpc>
           <a:spcPct val="90000"/>
         </a:lnSpc>
         <a:spcBef>
           <a:spcPct val="0"/>
         </a:spcBef>
-        <a:buNone/>
+        <a:spcAft>
+          <a:spcPct val="0"/>
+        </a:spcAft>
         <a:defRPr sz="4400" kern="1200">
           <a:solidFill>
             <a:schemeClr val="tx1"/>
@@ -2687,16 +3016,155 @@
           <a:cs typeface="+mj-cs"/>
         </a:defRPr>
       </a:lvl1pPr>
+      <a:lvl2pPr algn="l" rtl="0" fontAlgn="base">
+        <a:lnSpc>
+          <a:spcPct val="90000"/>
+        </a:lnSpc>
+        <a:spcBef>
+          <a:spcPct val="0"/>
+        </a:spcBef>
+        <a:spcAft>
+          <a:spcPct val="0"/>
+        </a:spcAft>
+        <a:defRPr sz="4400">
+          <a:solidFill>
+            <a:schemeClr val="tx1"/>
+          </a:solidFill>
+          <a:latin typeface="Calibri Light"/>
+        </a:defRPr>
+      </a:lvl2pPr>
+      <a:lvl3pPr algn="l" rtl="0" fontAlgn="base">
+        <a:lnSpc>
+          <a:spcPct val="90000"/>
+        </a:lnSpc>
+        <a:spcBef>
+          <a:spcPct val="0"/>
+        </a:spcBef>
+        <a:spcAft>
+          <a:spcPct val="0"/>
+        </a:spcAft>
+        <a:defRPr sz="4400">
+          <a:solidFill>
+            <a:schemeClr val="tx1"/>
+          </a:solidFill>
+          <a:latin typeface="Calibri Light"/>
+        </a:defRPr>
+      </a:lvl3pPr>
+      <a:lvl4pPr algn="l" rtl="0" fontAlgn="base">
+        <a:lnSpc>
+          <a:spcPct val="90000"/>
+        </a:lnSpc>
+        <a:spcBef>
+          <a:spcPct val="0"/>
+        </a:spcBef>
+        <a:spcAft>
+          <a:spcPct val="0"/>
+        </a:spcAft>
+        <a:defRPr sz="4400">
+          <a:solidFill>
+            <a:schemeClr val="tx1"/>
+          </a:solidFill>
+          <a:latin typeface="Calibri Light"/>
+        </a:defRPr>
+      </a:lvl4pPr>
+      <a:lvl5pPr algn="l" rtl="0" fontAlgn="base">
+        <a:lnSpc>
+          <a:spcPct val="90000"/>
+        </a:lnSpc>
+        <a:spcBef>
+          <a:spcPct val="0"/>
+        </a:spcBef>
+        <a:spcAft>
+          <a:spcPct val="0"/>
+        </a:spcAft>
+        <a:defRPr sz="4400">
+          <a:solidFill>
+            <a:schemeClr val="tx1"/>
+          </a:solidFill>
+          <a:latin typeface="Calibri Light"/>
+        </a:defRPr>
+      </a:lvl5pPr>
+      <a:lvl6pPr marL="457200" algn="l" rtl="0" fontAlgn="base">
+        <a:lnSpc>
+          <a:spcPct val="90000"/>
+        </a:lnSpc>
+        <a:spcBef>
+          <a:spcPct val="0"/>
+        </a:spcBef>
+        <a:spcAft>
+          <a:spcPct val="0"/>
+        </a:spcAft>
+        <a:defRPr sz="4400">
+          <a:solidFill>
+            <a:schemeClr val="tx1"/>
+          </a:solidFill>
+          <a:latin typeface="Calibri Light"/>
+        </a:defRPr>
+      </a:lvl6pPr>
+      <a:lvl7pPr marL="914400" algn="l" rtl="0" fontAlgn="base">
+        <a:lnSpc>
+          <a:spcPct val="90000"/>
+        </a:lnSpc>
+        <a:spcBef>
+          <a:spcPct val="0"/>
+        </a:spcBef>
+        <a:spcAft>
+          <a:spcPct val="0"/>
+        </a:spcAft>
+        <a:defRPr sz="4400">
+          <a:solidFill>
+            <a:schemeClr val="tx1"/>
+          </a:solidFill>
+          <a:latin typeface="Calibri Light"/>
+        </a:defRPr>
+      </a:lvl7pPr>
+      <a:lvl8pPr marL="1371600" algn="l" rtl="0" fontAlgn="base">
+        <a:lnSpc>
+          <a:spcPct val="90000"/>
+        </a:lnSpc>
+        <a:spcBef>
+          <a:spcPct val="0"/>
+        </a:spcBef>
+        <a:spcAft>
+          <a:spcPct val="0"/>
+        </a:spcAft>
+        <a:defRPr sz="4400">
+          <a:solidFill>
+            <a:schemeClr val="tx1"/>
+          </a:solidFill>
+          <a:latin typeface="Calibri Light"/>
+        </a:defRPr>
+      </a:lvl8pPr>
+      <a:lvl9pPr marL="1828800" algn="l" rtl="0" fontAlgn="base">
+        <a:lnSpc>
+          <a:spcPct val="90000"/>
+        </a:lnSpc>
+        <a:spcBef>
+          <a:spcPct val="0"/>
+        </a:spcBef>
+        <a:spcAft>
+          <a:spcPct val="0"/>
+        </a:spcAft>
+        <a:defRPr sz="4400">
+          <a:solidFill>
+            <a:schemeClr val="tx1"/>
+          </a:solidFill>
+          <a:latin typeface="Calibri Light"/>
+        </a:defRPr>
+      </a:lvl9pPr>
     </p:titleStyle>
     <p:bodyStyle>
-      <a:lvl1pPr marL="228600" indent="-228600" algn="l" defTabSz="914400" rtl="0" eaLnBrk="1" latinLnBrk="0" hangingPunct="1">
+      <a:lvl1pPr marL="228600" indent="-228600" algn="l" rtl="0" fontAlgn="base">
         <a:lnSpc>
           <a:spcPct val="90000"/>
         </a:lnSpc>
         <a:spcBef>
           <a:spcPts val="1000"/>
         </a:spcBef>
-        <a:buFont typeface="Arial" panose="020B0604020202020204" pitchFamily="34" charset="0"/>
+        <a:spcAft>
+          <a:spcPct val="0"/>
+        </a:spcAft>
+        <a:buFont typeface="Arial" charset="0"/>
         <a:buChar char="•"/>
         <a:defRPr sz="2800" kern="1200">
           <a:solidFill>
@@ -2707,14 +3175,17 @@
           <a:cs typeface="+mn-cs"/>
         </a:defRPr>
       </a:lvl1pPr>
-      <a:lvl2pPr marL="685800" indent="-228600" algn="l" defTabSz="914400" rtl="0" eaLnBrk="1" latinLnBrk="0" hangingPunct="1">
+      <a:lvl2pPr marL="685800" indent="-228600" algn="l" rtl="0" fontAlgn="base">
         <a:lnSpc>
           <a:spcPct val="90000"/>
         </a:lnSpc>
         <a:spcBef>
           <a:spcPts val="500"/>
         </a:spcBef>
-        <a:buFont typeface="Arial" panose="020B0604020202020204" pitchFamily="34" charset="0"/>
+        <a:spcAft>
+          <a:spcPct val="0"/>
+        </a:spcAft>
+        <a:buFont typeface="Arial" charset="0"/>
         <a:buChar char="•"/>
         <a:defRPr sz="2400" kern="1200">
           <a:solidFill>
@@ -2725,14 +3196,17 @@
           <a:cs typeface="+mn-cs"/>
         </a:defRPr>
       </a:lvl2pPr>
-      <a:lvl3pPr marL="1143000" indent="-228600" algn="l" defTabSz="914400" rtl="0" eaLnBrk="1" latinLnBrk="0" hangingPunct="1">
+      <a:lvl3pPr marL="1143000" indent="-228600" algn="l" rtl="0" fontAlgn="base">
         <a:lnSpc>
           <a:spcPct val="90000"/>
         </a:lnSpc>
         <a:spcBef>
           <a:spcPts val="500"/>
         </a:spcBef>
-        <a:buFont typeface="Arial" panose="020B0604020202020204" pitchFamily="34" charset="0"/>
+        <a:spcAft>
+          <a:spcPct val="0"/>
+        </a:spcAft>
+        <a:buFont typeface="Arial" charset="0"/>
         <a:buChar char="•"/>
         <a:defRPr sz="2000" kern="1200">
           <a:solidFill>
@@ -2743,16 +3217,19 @@
           <a:cs typeface="+mn-cs"/>
         </a:defRPr>
       </a:lvl3pPr>
-      <a:lvl4pPr marL="1600200" indent="-228600" algn="l" defTabSz="914400" rtl="0" eaLnBrk="1" latinLnBrk="0" hangingPunct="1">
+      <a:lvl4pPr marL="1600200" indent="-228600" algn="l" rtl="0" fontAlgn="base">
         <a:lnSpc>
           <a:spcPct val="90000"/>
         </a:lnSpc>
         <a:spcBef>
           <a:spcPts val="500"/>
         </a:spcBef>
-        <a:buFont typeface="Arial" panose="020B0604020202020204" pitchFamily="34" charset="0"/>
+        <a:spcAft>
+          <a:spcPct val="0"/>
+        </a:spcAft>
+        <a:buFont typeface="Arial" charset="0"/>
         <a:buChar char="•"/>
-        <a:defRPr sz="1800" kern="1200">
+        <a:defRPr kern="1200">
           <a:solidFill>
             <a:schemeClr val="tx1"/>
           </a:solidFill>
@@ -2761,16 +3238,19 @@
           <a:cs typeface="+mn-cs"/>
         </a:defRPr>
       </a:lvl4pPr>
-      <a:lvl5pPr marL="2057400" indent="-228600" algn="l" defTabSz="914400" rtl="0" eaLnBrk="1" latinLnBrk="0" hangingPunct="1">
+      <a:lvl5pPr marL="2057400" indent="-228600" algn="l" rtl="0" fontAlgn="base">
         <a:lnSpc>
           <a:spcPct val="90000"/>
         </a:lnSpc>
         <a:spcBef>
           <a:spcPts val="500"/>
         </a:spcBef>
-        <a:buFont typeface="Arial" panose="020B0604020202020204" pitchFamily="34" charset="0"/>
+        <a:spcAft>
+          <a:spcPct val="0"/>
+        </a:spcAft>
+        <a:buFont typeface="Arial" charset="0"/>
         <a:buChar char="•"/>
-        <a:defRPr sz="1800" kern="1200">
+        <a:defRPr kern="1200">
           <a:solidFill>
             <a:schemeClr val="tx1"/>
           </a:solidFill>
@@ -2970,7 +3450,7 @@
       </p:grpSpPr>
       <p:sp>
         <p:nvSpPr>
-          <p:cNvPr id="2" name="Titolo 1"/>
+          <p:cNvPr id="13313" name="Titolo 1"/>
           <p:cNvSpPr>
             <a:spLocks noGrp="1"/>
           </p:cNvSpPr>
@@ -2984,20 +3464,15 @@
           <a:lstStyle/>
           <a:p>
             <a:r>
-              <a:rPr lang="it-IT" dirty="0" smtClean="0"/>
-              <a:t>Programmazione Robot utilizzando </a:t>
-            </a:r>
-            <a:r>
-              <a:rPr lang="it-IT" dirty="0" err="1" smtClean="0"/>
-              <a:t>Git</a:t>
-            </a:r>
-            <a:endParaRPr lang="it-IT" dirty="0"/>
-          </a:p>
-        </p:txBody>
-      </p:sp>
-      <p:sp>
-        <p:nvSpPr>
-          <p:cNvPr id="3" name="Segnaposto contenuto 2"/>
+              <a:rPr lang="it-IT" smtClean="0"/>
+              <a:t>Programmazione Robot utilizzando Git</a:t>
+            </a:r>
+          </a:p>
+        </p:txBody>
+      </p:sp>
+      <p:sp>
+        <p:nvSpPr>
+          <p:cNvPr id="13314" name="Segnaposto contenuto 2"/>
           <p:cNvSpPr>
             <a:spLocks noGrp="1"/>
           </p:cNvSpPr>
@@ -3011,28 +3486,362 @@
           <a:lstStyle/>
           <a:p>
             <a:r>
-              <a:rPr lang="it-IT" dirty="0" smtClean="0"/>
+              <a:rPr lang="it-IT" smtClean="0"/>
               <a:t>Creare un’animazione di un braccio robotico formato da 2 rettangoli che sono suddivisi in 2 triangoli.</a:t>
             </a:r>
           </a:p>
           <a:p>
             <a:r>
-              <a:rPr lang="it-IT" dirty="0" smtClean="0"/>
+              <a:rPr lang="it-IT" smtClean="0"/>
               <a:t>Creare 3 triangoli in specifici punti che rappresenteranno gli ostacoli</a:t>
             </a:r>
           </a:p>
         </p:txBody>
       </p:sp>
+      <p:sp>
+        <p:nvSpPr>
+          <p:cNvPr id="13316" name="Titolo 1"/>
+          <p:cNvSpPr>
+            <a:spLocks/>
+          </p:cNvSpPr>
+          <p:nvPr/>
+        </p:nvSpPr>
+        <p:spPr bwMode="auto">
+          <a:xfrm>
+            <a:off x="838200" y="365125"/>
+            <a:ext cx="10515600" cy="1325563"/>
+          </a:xfrm>
+          <a:prstGeom prst="rect">
+            <a:avLst/>
+          </a:prstGeom>
+          <a:noFill/>
+          <a:ln w="9525">
+            <a:noFill/>
+            <a:miter lim="800000"/>
+            <a:headEnd/>
+            <a:tailEnd/>
+          </a:ln>
+        </p:spPr>
+        <p:txBody>
+          <a:bodyPr anchor="ctr"/>
+          <a:lstStyle/>
+          <a:p>
+            <a:pPr>
+              <a:lnSpc>
+                <a:spcPct val="90000"/>
+              </a:lnSpc>
+            </a:pPr>
+            <a:r>
+              <a:rPr lang="it-IT" sz="4400">
+                <a:latin typeface="Calibri Light"/>
+              </a:rPr>
+              <a:t>Programmazione Robot utilizzando Git</a:t>
+            </a:r>
+          </a:p>
+        </p:txBody>
+      </p:sp>
+      <p:sp>
+        <p:nvSpPr>
+          <p:cNvPr id="13317" name="Segnaposto contenuto 2"/>
+          <p:cNvSpPr>
+            <a:spLocks/>
+          </p:cNvSpPr>
+          <p:nvPr/>
+        </p:nvSpPr>
+        <p:spPr bwMode="auto">
+          <a:xfrm>
+            <a:off x="838200" y="1825625"/>
+            <a:ext cx="10515600" cy="4351338"/>
+          </a:xfrm>
+          <a:prstGeom prst="rect">
+            <a:avLst/>
+          </a:prstGeom>
+          <a:noFill/>
+          <a:ln w="9525">
+            <a:noFill/>
+            <a:miter lim="800000"/>
+            <a:headEnd/>
+            <a:tailEnd/>
+          </a:ln>
+        </p:spPr>
+        <p:txBody>
+          <a:bodyPr/>
+          <a:lstStyle/>
+          <a:p>
+            <a:pPr marL="228600" indent="-228600">
+              <a:lnSpc>
+                <a:spcPct val="90000"/>
+              </a:lnSpc>
+              <a:spcBef>
+                <a:spcPts val="1000"/>
+              </a:spcBef>
+              <a:buFont typeface="Arial" charset="0"/>
+              <a:buChar char="•"/>
+            </a:pPr>
+            <a:r>
+              <a:rPr lang="it-IT" sz="2800">
+                <a:latin typeface="Calibri" pitchFamily="34" charset="0"/>
+              </a:rPr>
+              <a:t>Creare un’animazione di un braccio robotico formato da 2 rettangoli che sono suddivisi in 2 triangoli.</a:t>
+            </a:r>
+          </a:p>
+          <a:p>
+            <a:pPr marL="228600" indent="-228600">
+              <a:lnSpc>
+                <a:spcPct val="90000"/>
+              </a:lnSpc>
+              <a:spcBef>
+                <a:spcPts val="1000"/>
+              </a:spcBef>
+              <a:buFont typeface="Arial" charset="0"/>
+              <a:buChar char="•"/>
+            </a:pPr>
+            <a:r>
+              <a:rPr lang="it-IT" sz="2800">
+                <a:latin typeface="Calibri" pitchFamily="34" charset="0"/>
+              </a:rPr>
+              <a:t>Creare 3 triangoli in specifici punti che rappresenteranno gli ostacoli</a:t>
+            </a:r>
+          </a:p>
+        </p:txBody>
+      </p:sp>
     </p:spTree>
-    <p:extLst>
-      <p:ext uri="{BB962C8B-B14F-4D97-AF65-F5344CB8AC3E}">
-        <p14:creationId xmlns:p14="http://schemas.microsoft.com/office/powerpoint/2010/main" val="1655442176"/>
-      </p:ext>
-    </p:extLst>
   </p:cSld>
   <p:clrMapOvr>
     <a:masterClrMapping/>
   </p:clrMapOvr>
+  <p:timing>
+    <p:tnLst>
+      <p:par>
+        <p:cTn id="1" dur="indefinite" restart="never" nodeType="tmRoot">
+          <p:childTnLst>
+            <p:seq concurrent="1" nextAc="seek">
+              <p:cTn id="2" dur="indefinite" nodeType="mainSeq">
+                <p:childTnLst>
+                  <p:par>
+                    <p:cTn id="3" fill="hold">
+                      <p:stCondLst>
+                        <p:cond delay="indefinite"/>
+                      </p:stCondLst>
+                      <p:childTnLst>
+                        <p:par>
+                          <p:cTn id="4" fill="hold">
+                            <p:stCondLst>
+                              <p:cond delay="0"/>
+                            </p:stCondLst>
+                            <p:childTnLst>
+                              <p:par>
+                                <p:cTn id="5" presetID="56" presetClass="entr" presetSubtype="0" fill="hold" grpId="0" nodeType="clickEffect">
+                                  <p:stCondLst>
+                                    <p:cond delay="0"/>
+                                  </p:stCondLst>
+                                  <p:iterate type="lt">
+                                    <p:tmPct val="10000"/>
+                                  </p:iterate>
+                                  <p:childTnLst>
+                                    <p:set>
+                                      <p:cBhvr>
+                                        <p:cTn id="6" dur="1" fill="hold">
+                                          <p:stCondLst>
+                                            <p:cond delay="0"/>
+                                          </p:stCondLst>
+                                        </p:cTn>
+                                        <p:tgtEl>
+                                          <p:spTgt spid="13316"/>
+                                        </p:tgtEl>
+                                        <p:attrNameLst>
+                                          <p:attrName>style.visibility</p:attrName>
+                                        </p:attrNameLst>
+                                      </p:cBhvr>
+                                      <p:to>
+                                        <p:strVal val="visible"/>
+                                      </p:to>
+                                    </p:set>
+                                    <p:anim by="(-#ppt_w*2)" calcmode="lin" valueType="num">
+                                      <p:cBhvr rctx="PPT">
+                                        <p:cTn id="7" dur="500" autoRev="1" fill="hold">
+                                          <p:stCondLst>
+                                            <p:cond delay="0"/>
+                                          </p:stCondLst>
+                                        </p:cTn>
+                                        <p:tgtEl>
+                                          <p:spTgt spid="13316"/>
+                                        </p:tgtEl>
+                                        <p:attrNameLst>
+                                          <p:attrName>ppt_w</p:attrName>
+                                        </p:attrNameLst>
+                                      </p:cBhvr>
+                                    </p:anim>
+                                    <p:anim by="(#ppt_w*0.50)" calcmode="lin" valueType="num">
+                                      <p:cBhvr>
+                                        <p:cTn id="8" dur="500" decel="50000" autoRev="1" fill="hold">
+                                          <p:stCondLst>
+                                            <p:cond delay="0"/>
+                                          </p:stCondLst>
+                                        </p:cTn>
+                                        <p:tgtEl>
+                                          <p:spTgt spid="13316"/>
+                                        </p:tgtEl>
+                                        <p:attrNameLst>
+                                          <p:attrName>ppt_x</p:attrName>
+                                        </p:attrNameLst>
+                                      </p:cBhvr>
+                                    </p:anim>
+                                    <p:anim from="(-#ppt_h/2)" to="(#ppt_y)" calcmode="lin" valueType="num">
+                                      <p:cBhvr>
+                                        <p:cTn id="9" dur="1000" fill="hold">
+                                          <p:stCondLst>
+                                            <p:cond delay="0"/>
+                                          </p:stCondLst>
+                                        </p:cTn>
+                                        <p:tgtEl>
+                                          <p:spTgt spid="13316"/>
+                                        </p:tgtEl>
+                                        <p:attrNameLst>
+                                          <p:attrName>ppt_y</p:attrName>
+                                        </p:attrNameLst>
+                                      </p:cBhvr>
+                                    </p:anim>
+                                    <p:animRot by="21600000">
+                                      <p:cBhvr>
+                                        <p:cTn id="10" dur="1000" fill="hold">
+                                          <p:stCondLst>
+                                            <p:cond delay="0"/>
+                                          </p:stCondLst>
+                                        </p:cTn>
+                                        <p:tgtEl>
+                                          <p:spTgt spid="13316"/>
+                                        </p:tgtEl>
+                                        <p:attrNameLst>
+                                          <p:attrName>r</p:attrName>
+                                        </p:attrNameLst>
+                                      </p:cBhvr>
+                                    </p:animRot>
+                                  </p:childTnLst>
+                                </p:cTn>
+                              </p:par>
+                              <p:par>
+                                <p:cTn id="11" presetID="56" presetClass="entr" presetSubtype="0" fill="hold" grpId="0" nodeType="withEffect">
+                                  <p:stCondLst>
+                                    <p:cond delay="0"/>
+                                  </p:stCondLst>
+                                  <p:iterate type="lt">
+                                    <p:tmPct val="10000"/>
+                                  </p:iterate>
+                                  <p:childTnLst>
+                                    <p:set>
+                                      <p:cBhvr>
+                                        <p:cTn id="12" dur="1" fill="hold">
+                                          <p:stCondLst>
+                                            <p:cond delay="0"/>
+                                          </p:stCondLst>
+                                        </p:cTn>
+                                        <p:tgtEl>
+                                          <p:spTgt spid="13317"/>
+                                        </p:tgtEl>
+                                        <p:attrNameLst>
+                                          <p:attrName>style.visibility</p:attrName>
+                                        </p:attrNameLst>
+                                      </p:cBhvr>
+                                      <p:to>
+                                        <p:strVal val="visible"/>
+                                      </p:to>
+                                    </p:set>
+                                    <p:anim by="(-#ppt_w*2)" calcmode="lin" valueType="num">
+                                      <p:cBhvr rctx="PPT">
+                                        <p:cTn id="13" dur="500" autoRev="1" fill="hold">
+                                          <p:stCondLst>
+                                            <p:cond delay="0"/>
+                                          </p:stCondLst>
+                                        </p:cTn>
+                                        <p:tgtEl>
+                                          <p:spTgt spid="13317"/>
+                                        </p:tgtEl>
+                                        <p:attrNameLst>
+                                          <p:attrName>ppt_w</p:attrName>
+                                        </p:attrNameLst>
+                                      </p:cBhvr>
+                                    </p:anim>
+                                    <p:anim by="(#ppt_w*0.50)" calcmode="lin" valueType="num">
+                                      <p:cBhvr>
+                                        <p:cTn id="14" dur="500" decel="50000" autoRev="1" fill="hold">
+                                          <p:stCondLst>
+                                            <p:cond delay="0"/>
+                                          </p:stCondLst>
+                                        </p:cTn>
+                                        <p:tgtEl>
+                                          <p:spTgt spid="13317"/>
+                                        </p:tgtEl>
+                                        <p:attrNameLst>
+                                          <p:attrName>ppt_x</p:attrName>
+                                        </p:attrNameLst>
+                                      </p:cBhvr>
+                                    </p:anim>
+                                    <p:anim from="(-#ppt_h/2)" to="(#ppt_y)" calcmode="lin" valueType="num">
+                                      <p:cBhvr>
+                                        <p:cTn id="15" dur="1000" fill="hold">
+                                          <p:stCondLst>
+                                            <p:cond delay="0"/>
+                                          </p:stCondLst>
+                                        </p:cTn>
+                                        <p:tgtEl>
+                                          <p:spTgt spid="13317"/>
+                                        </p:tgtEl>
+                                        <p:attrNameLst>
+                                          <p:attrName>ppt_y</p:attrName>
+                                        </p:attrNameLst>
+                                      </p:cBhvr>
+                                    </p:anim>
+                                    <p:animRot by="21600000">
+                                      <p:cBhvr>
+                                        <p:cTn id="16" dur="1000" fill="hold">
+                                          <p:stCondLst>
+                                            <p:cond delay="0"/>
+                                          </p:stCondLst>
+                                        </p:cTn>
+                                        <p:tgtEl>
+                                          <p:spTgt spid="13317"/>
+                                        </p:tgtEl>
+                                        <p:attrNameLst>
+                                          <p:attrName>r</p:attrName>
+                                        </p:attrNameLst>
+                                      </p:cBhvr>
+                                    </p:animRot>
+                                  </p:childTnLst>
+                                </p:cTn>
+                              </p:par>
+                            </p:childTnLst>
+                          </p:cTn>
+                        </p:par>
+                      </p:childTnLst>
+                    </p:cTn>
+                  </p:par>
+                </p:childTnLst>
+              </p:cTn>
+              <p:prevCondLst>
+                <p:cond evt="onPrev" delay="0">
+                  <p:tgtEl>
+                    <p:sldTgt/>
+                  </p:tgtEl>
+                </p:cond>
+              </p:prevCondLst>
+              <p:nextCondLst>
+                <p:cond evt="onNext" delay="0">
+                  <p:tgtEl>
+                    <p:sldTgt/>
+                  </p:tgtEl>
+                </p:cond>
+              </p:nextCondLst>
+            </p:seq>
+          </p:childTnLst>
+        </p:cTn>
+      </p:par>
+    </p:tnLst>
+    <p:bldLst>
+      <p:bldP spid="13316" grpId="0"/>
+      <p:bldP spid="13317" grpId="0"/>
+    </p:bldLst>
+  </p:timing>
 </p:sld>
 </file>
 
@@ -3055,7 +3864,7 @@
       </p:grpSpPr>
       <p:sp>
         <p:nvSpPr>
-          <p:cNvPr id="2" name="Titolo 1"/>
+          <p:cNvPr id="14337" name="Titolo 1"/>
           <p:cNvSpPr>
             <a:spLocks noGrp="1"/>
           </p:cNvSpPr>
@@ -3069,16 +3878,15 @@
           <a:lstStyle/>
           <a:p>
             <a:r>
-              <a:rPr lang="it-IT" dirty="0" smtClean="0"/>
+              <a:rPr lang="it-IT" smtClean="0"/>
               <a:t>Scopo del braccio</a:t>
             </a:r>
-            <a:endParaRPr lang="it-IT" dirty="0"/>
-          </a:p>
-        </p:txBody>
-      </p:sp>
-      <p:sp>
-        <p:nvSpPr>
-          <p:cNvPr id="3" name="Segnaposto contenuto 2"/>
+          </a:p>
+        </p:txBody>
+      </p:sp>
+      <p:sp>
+        <p:nvSpPr>
+          <p:cNvPr id="14338" name="Segnaposto contenuto 2"/>
           <p:cNvSpPr>
             <a:spLocks noGrp="1"/>
           </p:cNvSpPr>
@@ -3092,42 +3900,696 @@
           <a:lstStyle/>
           <a:p>
             <a:r>
-              <a:rPr lang="it-IT" dirty="0" smtClean="0"/>
-              <a:t>Il braccio robotico deve continuare a girare in entrambe le «direzioni» (entrambi i </a:t>
-            </a:r>
-            <a:r>
-              <a:rPr lang="it-IT" dirty="0" err="1" smtClean="0"/>
-              <a:t>trianogoli</a:t>
-            </a:r>
-            <a:r>
-              <a:rPr lang="it-IT" dirty="0" smtClean="0"/>
-              <a:t>) in modo da completare un giro completo.</a:t>
-            </a:r>
-          </a:p>
-          <a:p>
-            <a:r>
-              <a:rPr lang="it-IT" dirty="0" smtClean="0"/>
+              <a:rPr lang="it-IT" smtClean="0"/>
+              <a:t>Il braccio robotico deve continuare a girare in entrambe le «direzioni» (entrambi i trianogoli) in modo da completare un giro completo.</a:t>
+            </a:r>
+          </a:p>
+          <a:p>
+            <a:r>
+              <a:rPr lang="it-IT" smtClean="0"/>
               <a:t>Mentre il braccio ruota il programma deve rilevare le collisioni tra triangolo e robot.</a:t>
             </a:r>
           </a:p>
           <a:p>
             <a:r>
-              <a:rPr lang="it-IT" dirty="0" smtClean="0"/>
+              <a:rPr lang="it-IT" smtClean="0"/>
               <a:t>Stampare un grafico in cui l’asse delle ascisse corrisponde all’angolo di inclinazione del rettangolo «esterno» e l’asse delle ordinate corrisponde all’angolo di inclinazione del rettangolo «interno»</a:t>
             </a:r>
           </a:p>
         </p:txBody>
       </p:sp>
+      <p:sp>
+        <p:nvSpPr>
+          <p:cNvPr id="14340" name="Titolo 1"/>
+          <p:cNvSpPr>
+            <a:spLocks/>
+          </p:cNvSpPr>
+          <p:nvPr/>
+        </p:nvSpPr>
+        <p:spPr bwMode="auto">
+          <a:xfrm>
+            <a:off x="838200" y="365125"/>
+            <a:ext cx="10515600" cy="1325563"/>
+          </a:xfrm>
+          <a:prstGeom prst="rect">
+            <a:avLst/>
+          </a:prstGeom>
+          <a:noFill/>
+          <a:ln w="9525">
+            <a:noFill/>
+            <a:miter lim="800000"/>
+            <a:headEnd/>
+            <a:tailEnd/>
+          </a:ln>
+        </p:spPr>
+        <p:txBody>
+          <a:bodyPr anchor="ctr"/>
+          <a:lstStyle/>
+          <a:p>
+            <a:pPr>
+              <a:lnSpc>
+                <a:spcPct val="90000"/>
+              </a:lnSpc>
+            </a:pPr>
+            <a:r>
+              <a:rPr lang="it-IT" sz="4400">
+                <a:latin typeface="Calibri Light"/>
+              </a:rPr>
+              <a:t>Scopo del braccio</a:t>
+            </a:r>
+          </a:p>
+        </p:txBody>
+      </p:sp>
+      <p:sp>
+        <p:nvSpPr>
+          <p:cNvPr id="14341" name="Segnaposto contenuto 2"/>
+          <p:cNvSpPr>
+            <a:spLocks/>
+          </p:cNvSpPr>
+          <p:nvPr/>
+        </p:nvSpPr>
+        <p:spPr bwMode="auto">
+          <a:xfrm>
+            <a:off x="838200" y="1825625"/>
+            <a:ext cx="10515600" cy="4351338"/>
+          </a:xfrm>
+          <a:prstGeom prst="rect">
+            <a:avLst/>
+          </a:prstGeom>
+          <a:noFill/>
+          <a:ln w="9525">
+            <a:noFill/>
+            <a:miter lim="800000"/>
+            <a:headEnd/>
+            <a:tailEnd/>
+          </a:ln>
+        </p:spPr>
+        <p:txBody>
+          <a:bodyPr/>
+          <a:lstStyle/>
+          <a:p>
+            <a:pPr marL="228600" indent="-228600">
+              <a:lnSpc>
+                <a:spcPct val="90000"/>
+              </a:lnSpc>
+              <a:spcBef>
+                <a:spcPts val="1000"/>
+              </a:spcBef>
+              <a:buFont typeface="Arial" charset="0"/>
+              <a:buChar char="•"/>
+            </a:pPr>
+            <a:r>
+              <a:rPr lang="it-IT" sz="2800">
+                <a:latin typeface="Calibri" pitchFamily="34" charset="0"/>
+              </a:rPr>
+              <a:t>Il braccio robotico deve continuare a girare in entrambe le «direzioni» (entrambi i trianogoli) in modo da completare un giro completo.</a:t>
+            </a:r>
+          </a:p>
+          <a:p>
+            <a:pPr marL="228600" indent="-228600">
+              <a:lnSpc>
+                <a:spcPct val="90000"/>
+              </a:lnSpc>
+              <a:spcBef>
+                <a:spcPts val="1000"/>
+              </a:spcBef>
+              <a:buFont typeface="Arial" charset="0"/>
+              <a:buChar char="•"/>
+            </a:pPr>
+            <a:r>
+              <a:rPr lang="it-IT" sz="2800">
+                <a:latin typeface="Calibri" pitchFamily="34" charset="0"/>
+              </a:rPr>
+              <a:t>Mentre il braccio ruota il programma deve rilevare le collisioni tra triangolo e robot.</a:t>
+            </a:r>
+          </a:p>
+          <a:p>
+            <a:pPr marL="228600" indent="-228600">
+              <a:lnSpc>
+                <a:spcPct val="90000"/>
+              </a:lnSpc>
+              <a:spcBef>
+                <a:spcPts val="1000"/>
+              </a:spcBef>
+              <a:buFont typeface="Arial" charset="0"/>
+              <a:buChar char="•"/>
+            </a:pPr>
+            <a:r>
+              <a:rPr lang="it-IT" sz="2800">
+                <a:latin typeface="Calibri" pitchFamily="34" charset="0"/>
+              </a:rPr>
+              <a:t>Stampare un grafico in cui l’asse delle ascisse corrisponde all’angolo di inclinazione del rettangolo «esterno» e l’asse delle ordinate corrisponde all’angolo di inclinazione del rettangolo «interno»</a:t>
+            </a:r>
+          </a:p>
+        </p:txBody>
+      </p:sp>
+      <p:sp>
+        <p:nvSpPr>
+          <p:cNvPr id="14342" name="Titolo 1"/>
+          <p:cNvSpPr>
+            <a:spLocks/>
+          </p:cNvSpPr>
+          <p:nvPr/>
+        </p:nvSpPr>
+        <p:spPr bwMode="auto">
+          <a:xfrm>
+            <a:off x="838200" y="365125"/>
+            <a:ext cx="10515600" cy="1325563"/>
+          </a:xfrm>
+          <a:prstGeom prst="rect">
+            <a:avLst/>
+          </a:prstGeom>
+          <a:noFill/>
+          <a:ln w="9525">
+            <a:noFill/>
+            <a:miter lim="800000"/>
+            <a:headEnd/>
+            <a:tailEnd/>
+          </a:ln>
+        </p:spPr>
+        <p:txBody>
+          <a:bodyPr anchor="ctr"/>
+          <a:lstStyle/>
+          <a:p>
+            <a:pPr>
+              <a:lnSpc>
+                <a:spcPct val="90000"/>
+              </a:lnSpc>
+            </a:pPr>
+            <a:r>
+              <a:rPr lang="it-IT" sz="4400">
+                <a:latin typeface="Calibri Light"/>
+              </a:rPr>
+              <a:t>Scopo del braccio</a:t>
+            </a:r>
+          </a:p>
+        </p:txBody>
+      </p:sp>
     </p:spTree>
-    <p:extLst>
-      <p:ext uri="{BB962C8B-B14F-4D97-AF65-F5344CB8AC3E}">
-        <p14:creationId xmlns:p14="http://schemas.microsoft.com/office/powerpoint/2010/main" val="3360097745"/>
-      </p:ext>
-    </p:extLst>
   </p:cSld>
   <p:clrMapOvr>
     <a:masterClrMapping/>
   </p:clrMapOvr>
+  <p:timing>
+    <p:tnLst>
+      <p:par>
+        <p:cTn id="1" dur="indefinite" restart="never" nodeType="tmRoot">
+          <p:childTnLst>
+            <p:seq concurrent="1" nextAc="seek">
+              <p:cTn id="2" dur="indefinite" nodeType="mainSeq">
+                <p:childTnLst>
+                  <p:par>
+                    <p:cTn id="3" fill="hold">
+                      <p:stCondLst>
+                        <p:cond delay="indefinite"/>
+                      </p:stCondLst>
+                      <p:childTnLst>
+                        <p:par>
+                          <p:cTn id="4" fill="hold">
+                            <p:stCondLst>
+                              <p:cond delay="0"/>
+                            </p:stCondLst>
+                            <p:childTnLst>
+                              <p:par>
+                                <p:cTn id="5" presetID="25" presetClass="entr" presetSubtype="0" fill="hold" grpId="0" nodeType="clickEffect">
+                                  <p:stCondLst>
+                                    <p:cond delay="0"/>
+                                  </p:stCondLst>
+                                  <p:childTnLst>
+                                    <p:set>
+                                      <p:cBhvr>
+                                        <p:cTn id="6" dur="1" fill="hold">
+                                          <p:stCondLst>
+                                            <p:cond delay="0"/>
+                                          </p:stCondLst>
+                                        </p:cTn>
+                                        <p:tgtEl>
+                                          <p:spTgt spid="14342"/>
+                                        </p:tgtEl>
+                                        <p:attrNameLst>
+                                          <p:attrName>style.visibility</p:attrName>
+                                        </p:attrNameLst>
+                                      </p:cBhvr>
+                                      <p:to>
+                                        <p:strVal val="visible"/>
+                                      </p:to>
+                                    </p:set>
+                                    <p:anim calcmode="lin" valueType="num">
+                                      <p:cBhvr>
+                                        <p:cTn id="7" dur="500" decel="50000" fill="hold">
+                                          <p:stCondLst>
+                                            <p:cond delay="0"/>
+                                          </p:stCondLst>
+                                        </p:cTn>
+                                        <p:tgtEl>
+                                          <p:spTgt spid="14342"/>
+                                        </p:tgtEl>
+                                        <p:attrNameLst>
+                                          <p:attrName>style.rotation</p:attrName>
+                                        </p:attrNameLst>
+                                      </p:cBhvr>
+                                      <p:tavLst>
+                                        <p:tav tm="0">
+                                          <p:val>
+                                            <p:fltVal val="-90"/>
+                                          </p:val>
+                                        </p:tav>
+                                        <p:tav tm="100000">
+                                          <p:val>
+                                            <p:fltVal val="0"/>
+                                          </p:val>
+                                        </p:tav>
+                                      </p:tavLst>
+                                    </p:anim>
+                                    <p:anim calcmode="lin" valueType="num">
+                                      <p:cBhvr>
+                                        <p:cTn id="8" dur="500" decel="50000" fill="hold">
+                                          <p:stCondLst>
+                                            <p:cond delay="0"/>
+                                          </p:stCondLst>
+                                        </p:cTn>
+                                        <p:tgtEl>
+                                          <p:spTgt spid="14342"/>
+                                        </p:tgtEl>
+                                        <p:attrNameLst>
+                                          <p:attrName>ppt_w</p:attrName>
+                                        </p:attrNameLst>
+                                      </p:cBhvr>
+                                      <p:tavLst>
+                                        <p:tav tm="0">
+                                          <p:val>
+                                            <p:strVal val="#ppt_w"/>
+                                          </p:val>
+                                        </p:tav>
+                                        <p:tav tm="100000">
+                                          <p:val>
+                                            <p:strVal val="#ppt_w*.05"/>
+                                          </p:val>
+                                        </p:tav>
+                                      </p:tavLst>
+                                    </p:anim>
+                                    <p:anim calcmode="lin" valueType="num">
+                                      <p:cBhvr>
+                                        <p:cTn id="9" dur="500" accel="50000" fill="hold">
+                                          <p:stCondLst>
+                                            <p:cond delay="500"/>
+                                          </p:stCondLst>
+                                        </p:cTn>
+                                        <p:tgtEl>
+                                          <p:spTgt spid="14342"/>
+                                        </p:tgtEl>
+                                        <p:attrNameLst>
+                                          <p:attrName>ppt_w</p:attrName>
+                                        </p:attrNameLst>
+                                      </p:cBhvr>
+                                      <p:tavLst>
+                                        <p:tav tm="0">
+                                          <p:val>
+                                            <p:strVal val="#ppt_w*.05"/>
+                                          </p:val>
+                                        </p:tav>
+                                        <p:tav tm="100000">
+                                          <p:val>
+                                            <p:strVal val="#ppt_w"/>
+                                          </p:val>
+                                        </p:tav>
+                                      </p:tavLst>
+                                    </p:anim>
+                                    <p:anim calcmode="lin" valueType="num">
+                                      <p:cBhvr>
+                                        <p:cTn id="10" dur="1000" fill="hold"/>
+                                        <p:tgtEl>
+                                          <p:spTgt spid="14342"/>
+                                        </p:tgtEl>
+                                        <p:attrNameLst>
+                                          <p:attrName>ppt_h</p:attrName>
+                                        </p:attrNameLst>
+                                      </p:cBhvr>
+                                      <p:tavLst>
+                                        <p:tav tm="0">
+                                          <p:val>
+                                            <p:strVal val="#ppt_h"/>
+                                          </p:val>
+                                        </p:tav>
+                                        <p:tav tm="100000">
+                                          <p:val>
+                                            <p:strVal val="#ppt_h"/>
+                                          </p:val>
+                                        </p:tav>
+                                      </p:tavLst>
+                                    </p:anim>
+                                    <p:anim calcmode="lin" valueType="num">
+                                      <p:cBhvr>
+                                        <p:cTn id="11" dur="500" decel="50000" fill="hold">
+                                          <p:stCondLst>
+                                            <p:cond delay="0"/>
+                                          </p:stCondLst>
+                                        </p:cTn>
+                                        <p:tgtEl>
+                                          <p:spTgt spid="14342"/>
+                                        </p:tgtEl>
+                                        <p:attrNameLst>
+                                          <p:attrName>ppt_x</p:attrName>
+                                        </p:attrNameLst>
+                                      </p:cBhvr>
+                                      <p:tavLst>
+                                        <p:tav tm="0">
+                                          <p:val>
+                                            <p:strVal val="#ppt_x+.4"/>
+                                          </p:val>
+                                        </p:tav>
+                                        <p:tav tm="100000">
+                                          <p:val>
+                                            <p:strVal val="#ppt_x"/>
+                                          </p:val>
+                                        </p:tav>
+                                      </p:tavLst>
+                                    </p:anim>
+                                    <p:anim calcmode="lin" valueType="num">
+                                      <p:cBhvr>
+                                        <p:cTn id="12" dur="500" decel="50000" fill="hold">
+                                          <p:stCondLst>
+                                            <p:cond delay="0"/>
+                                          </p:stCondLst>
+                                        </p:cTn>
+                                        <p:tgtEl>
+                                          <p:spTgt spid="14342"/>
+                                        </p:tgtEl>
+                                        <p:attrNameLst>
+                                          <p:attrName>ppt_y</p:attrName>
+                                        </p:attrNameLst>
+                                      </p:cBhvr>
+                                      <p:tavLst>
+                                        <p:tav tm="0">
+                                          <p:val>
+                                            <p:strVal val="#ppt_y-.2"/>
+                                          </p:val>
+                                        </p:tav>
+                                        <p:tav tm="100000">
+                                          <p:val>
+                                            <p:strVal val="#ppt_y+.1"/>
+                                          </p:val>
+                                        </p:tav>
+                                      </p:tavLst>
+                                    </p:anim>
+                                    <p:anim calcmode="lin" valueType="num">
+                                      <p:cBhvr>
+                                        <p:cTn id="13" dur="500" accel="50000" fill="hold">
+                                          <p:stCondLst>
+                                            <p:cond delay="500"/>
+                                          </p:stCondLst>
+                                        </p:cTn>
+                                        <p:tgtEl>
+                                          <p:spTgt spid="14342"/>
+                                        </p:tgtEl>
+                                        <p:attrNameLst>
+                                          <p:attrName>ppt_y</p:attrName>
+                                        </p:attrNameLst>
+                                      </p:cBhvr>
+                                      <p:tavLst>
+                                        <p:tav tm="0">
+                                          <p:val>
+                                            <p:strVal val="#ppt_y+.1"/>
+                                          </p:val>
+                                        </p:tav>
+                                        <p:tav tm="100000">
+                                          <p:val>
+                                            <p:strVal val="#ppt_y"/>
+                                          </p:val>
+                                        </p:tav>
+                                      </p:tavLst>
+                                    </p:anim>
+                                    <p:animEffect transition="in" filter="fade">
+                                      <p:cBhvr>
+                                        <p:cTn id="14" dur="1000" decel="50000">
+                                          <p:stCondLst>
+                                            <p:cond delay="0"/>
+                                          </p:stCondLst>
+                                        </p:cTn>
+                                        <p:tgtEl>
+                                          <p:spTgt spid="14342"/>
+                                        </p:tgtEl>
+                                      </p:cBhvr>
+                                    </p:animEffect>
+                                  </p:childTnLst>
+                                </p:cTn>
+                              </p:par>
+                              <p:par>
+                                <p:cTn id="15" presetID="25" presetClass="entr" presetSubtype="0" fill="hold" grpId="0" nodeType="withEffect">
+                                  <p:stCondLst>
+                                    <p:cond delay="0"/>
+                                  </p:stCondLst>
+                                  <p:childTnLst>
+                                    <p:set>
+                                      <p:cBhvr>
+                                        <p:cTn id="16" dur="1" fill="hold">
+                                          <p:stCondLst>
+                                            <p:cond delay="0"/>
+                                          </p:stCondLst>
+                                        </p:cTn>
+                                        <p:tgtEl>
+                                          <p:spTgt spid="14341"/>
+                                        </p:tgtEl>
+                                        <p:attrNameLst>
+                                          <p:attrName>style.visibility</p:attrName>
+                                        </p:attrNameLst>
+                                      </p:cBhvr>
+                                      <p:to>
+                                        <p:strVal val="visible"/>
+                                      </p:to>
+                                    </p:set>
+                                    <p:anim calcmode="lin" valueType="num">
+                                      <p:cBhvr>
+                                        <p:cTn id="17" dur="500" decel="50000" fill="hold">
+                                          <p:stCondLst>
+                                            <p:cond delay="0"/>
+                                          </p:stCondLst>
+                                        </p:cTn>
+                                        <p:tgtEl>
+                                          <p:spTgt spid="14341"/>
+                                        </p:tgtEl>
+                                        <p:attrNameLst>
+                                          <p:attrName>style.rotation</p:attrName>
+                                        </p:attrNameLst>
+                                      </p:cBhvr>
+                                      <p:tavLst>
+                                        <p:tav tm="0">
+                                          <p:val>
+                                            <p:fltVal val="-90"/>
+                                          </p:val>
+                                        </p:tav>
+                                        <p:tav tm="100000">
+                                          <p:val>
+                                            <p:fltVal val="0"/>
+                                          </p:val>
+                                        </p:tav>
+                                      </p:tavLst>
+                                    </p:anim>
+                                    <p:anim calcmode="lin" valueType="num">
+                                      <p:cBhvr>
+                                        <p:cTn id="18" dur="500" decel="50000" fill="hold">
+                                          <p:stCondLst>
+                                            <p:cond delay="0"/>
+                                          </p:stCondLst>
+                                        </p:cTn>
+                                        <p:tgtEl>
+                                          <p:spTgt spid="14341"/>
+                                        </p:tgtEl>
+                                        <p:attrNameLst>
+                                          <p:attrName>ppt_w</p:attrName>
+                                        </p:attrNameLst>
+                                      </p:cBhvr>
+                                      <p:tavLst>
+                                        <p:tav tm="0">
+                                          <p:val>
+                                            <p:strVal val="#ppt_w"/>
+                                          </p:val>
+                                        </p:tav>
+                                        <p:tav tm="100000">
+                                          <p:val>
+                                            <p:strVal val="#ppt_w*.05"/>
+                                          </p:val>
+                                        </p:tav>
+                                      </p:tavLst>
+                                    </p:anim>
+                                    <p:anim calcmode="lin" valueType="num">
+                                      <p:cBhvr>
+                                        <p:cTn id="19" dur="500" accel="50000" fill="hold">
+                                          <p:stCondLst>
+                                            <p:cond delay="500"/>
+                                          </p:stCondLst>
+                                        </p:cTn>
+                                        <p:tgtEl>
+                                          <p:spTgt spid="14341"/>
+                                        </p:tgtEl>
+                                        <p:attrNameLst>
+                                          <p:attrName>ppt_w</p:attrName>
+                                        </p:attrNameLst>
+                                      </p:cBhvr>
+                                      <p:tavLst>
+                                        <p:tav tm="0">
+                                          <p:val>
+                                            <p:strVal val="#ppt_w*.05"/>
+                                          </p:val>
+                                        </p:tav>
+                                        <p:tav tm="100000">
+                                          <p:val>
+                                            <p:strVal val="#ppt_w"/>
+                                          </p:val>
+                                        </p:tav>
+                                      </p:tavLst>
+                                    </p:anim>
+                                    <p:anim calcmode="lin" valueType="num">
+                                      <p:cBhvr>
+                                        <p:cTn id="20" dur="1000" fill="hold"/>
+                                        <p:tgtEl>
+                                          <p:spTgt spid="14341"/>
+                                        </p:tgtEl>
+                                        <p:attrNameLst>
+                                          <p:attrName>ppt_h</p:attrName>
+                                        </p:attrNameLst>
+                                      </p:cBhvr>
+                                      <p:tavLst>
+                                        <p:tav tm="0">
+                                          <p:val>
+                                            <p:strVal val="#ppt_h"/>
+                                          </p:val>
+                                        </p:tav>
+                                        <p:tav tm="100000">
+                                          <p:val>
+                                            <p:strVal val="#ppt_h"/>
+                                          </p:val>
+                                        </p:tav>
+                                      </p:tavLst>
+                                    </p:anim>
+                                    <p:anim calcmode="lin" valueType="num">
+                                      <p:cBhvr>
+                                        <p:cTn id="21" dur="500" decel="50000" fill="hold">
+                                          <p:stCondLst>
+                                            <p:cond delay="0"/>
+                                          </p:stCondLst>
+                                        </p:cTn>
+                                        <p:tgtEl>
+                                          <p:spTgt spid="14341"/>
+                                        </p:tgtEl>
+                                        <p:attrNameLst>
+                                          <p:attrName>ppt_x</p:attrName>
+                                        </p:attrNameLst>
+                                      </p:cBhvr>
+                                      <p:tavLst>
+                                        <p:tav tm="0">
+                                          <p:val>
+                                            <p:strVal val="#ppt_x+.4"/>
+                                          </p:val>
+                                        </p:tav>
+                                        <p:tav tm="100000">
+                                          <p:val>
+                                            <p:strVal val="#ppt_x"/>
+                                          </p:val>
+                                        </p:tav>
+                                      </p:tavLst>
+                                    </p:anim>
+                                    <p:anim calcmode="lin" valueType="num">
+                                      <p:cBhvr>
+                                        <p:cTn id="22" dur="500" decel="50000" fill="hold">
+                                          <p:stCondLst>
+                                            <p:cond delay="0"/>
+                                          </p:stCondLst>
+                                        </p:cTn>
+                                        <p:tgtEl>
+                                          <p:spTgt spid="14341"/>
+                                        </p:tgtEl>
+                                        <p:attrNameLst>
+                                          <p:attrName>ppt_y</p:attrName>
+                                        </p:attrNameLst>
+                                      </p:cBhvr>
+                                      <p:tavLst>
+                                        <p:tav tm="0">
+                                          <p:val>
+                                            <p:strVal val="#ppt_y-.2"/>
+                                          </p:val>
+                                        </p:tav>
+                                        <p:tav tm="100000">
+                                          <p:val>
+                                            <p:strVal val="#ppt_y+.1"/>
+                                          </p:val>
+                                        </p:tav>
+                                      </p:tavLst>
+                                    </p:anim>
+                                    <p:anim calcmode="lin" valueType="num">
+                                      <p:cBhvr>
+                                        <p:cTn id="23" dur="500" accel="50000" fill="hold">
+                                          <p:stCondLst>
+                                            <p:cond delay="500"/>
+                                          </p:stCondLst>
+                                        </p:cTn>
+                                        <p:tgtEl>
+                                          <p:spTgt spid="14341"/>
+                                        </p:tgtEl>
+                                        <p:attrNameLst>
+                                          <p:attrName>ppt_y</p:attrName>
+                                        </p:attrNameLst>
+                                      </p:cBhvr>
+                                      <p:tavLst>
+                                        <p:tav tm="0">
+                                          <p:val>
+                                            <p:strVal val="#ppt_y+.1"/>
+                                          </p:val>
+                                        </p:tav>
+                                        <p:tav tm="100000">
+                                          <p:val>
+                                            <p:strVal val="#ppt_y"/>
+                                          </p:val>
+                                        </p:tav>
+                                      </p:tavLst>
+                                    </p:anim>
+                                    <p:animEffect transition="in" filter="fade">
+                                      <p:cBhvr>
+                                        <p:cTn id="24" dur="1000" decel="50000">
+                                          <p:stCondLst>
+                                            <p:cond delay="0"/>
+                                          </p:stCondLst>
+                                        </p:cTn>
+                                        <p:tgtEl>
+                                          <p:spTgt spid="14341"/>
+                                        </p:tgtEl>
+                                      </p:cBhvr>
+                                    </p:animEffect>
+                                  </p:childTnLst>
+                                </p:cTn>
+                              </p:par>
+                            </p:childTnLst>
+                          </p:cTn>
+                        </p:par>
+                      </p:childTnLst>
+                    </p:cTn>
+                  </p:par>
+                </p:childTnLst>
+              </p:cTn>
+              <p:prevCondLst>
+                <p:cond evt="onPrev" delay="0">
+                  <p:tgtEl>
+                    <p:sldTgt/>
+                  </p:tgtEl>
+                </p:cond>
+              </p:prevCondLst>
+              <p:nextCondLst>
+                <p:cond evt="onNext" delay="0">
+                  <p:tgtEl>
+                    <p:sldTgt/>
+                  </p:tgtEl>
+                </p:cond>
+              </p:nextCondLst>
+            </p:seq>
+          </p:childTnLst>
+        </p:cTn>
+      </p:par>
+    </p:tnLst>
+    <p:bldLst>
+      <p:bldP spid="14341" grpId="0"/>
+      <p:bldP spid="14342" grpId="0"/>
+    </p:bldLst>
+  </p:timing>
 </p:sld>
 </file>
 
@@ -3148,36 +4610,9 @@
           <a:chExt cx="0" cy="0"/>
         </a:xfrm>
       </p:grpSpPr>
-      <p:sp>
-        <p:nvSpPr>
-          <p:cNvPr id="2" name="Titolo 1"/>
-          <p:cNvSpPr>
-            <a:spLocks noGrp="1"/>
-          </p:cNvSpPr>
-          <p:nvPr>
-            <p:ph type="title"/>
-          </p:nvPr>
-        </p:nvSpPr>
-        <p:spPr/>
-        <p:txBody>
-          <a:bodyPr/>
-          <a:lstStyle/>
-          <a:p>
-            <a:r>
-              <a:rPr lang="it-IT" dirty="0" smtClean="0"/>
-              <a:t>Progetto su </a:t>
-            </a:r>
-            <a:r>
-              <a:rPr lang="it-IT" dirty="0" err="1" smtClean="0"/>
-              <a:t>Git</a:t>
-            </a:r>
-            <a:endParaRPr lang="it-IT" dirty="0"/>
-          </a:p>
-        </p:txBody>
-      </p:sp>
       <p:pic>
         <p:nvPicPr>
-          <p:cNvPr id="4" name="Segnaposto contenuto 3"/>
+          <p:cNvPr id="15362" name="Segnaposto contenuto 3"/>
           <p:cNvPicPr>
             <a:picLocks noGrp="1" noChangeAspect="1"/>
           </p:cNvPicPr>
@@ -3186,34 +4621,335 @@
           </p:nvPr>
         </p:nvPicPr>
         <p:blipFill>
-          <a:blip r:embed="rId2">
-            <a:extLst>
-              <a:ext uri="{28A0092B-C50C-407E-A947-70E740481C1C}">
-                <a14:useLocalDpi xmlns:a14="http://schemas.microsoft.com/office/drawing/2010/main" val="0"/>
-              </a:ext>
-            </a:extLst>
-          </a:blip>
+          <a:blip r:embed="rId2"/>
+          <a:srcRect/>
           <a:stretch>
             <a:fillRect/>
           </a:stretch>
         </p:blipFill>
         <p:spPr>
           <a:xfrm>
-            <a:off x="73468" y="1690688"/>
-            <a:ext cx="12045064" cy="7374529"/>
+            <a:off x="73025" y="1690688"/>
+            <a:ext cx="12045950" cy="7373937"/>
           </a:xfrm>
         </p:spPr>
       </p:pic>
+      <p:sp>
+        <p:nvSpPr>
+          <p:cNvPr id="15364" name="Titolo 1"/>
+          <p:cNvSpPr>
+            <a:spLocks/>
+          </p:cNvSpPr>
+          <p:nvPr/>
+        </p:nvSpPr>
+        <p:spPr bwMode="auto">
+          <a:xfrm>
+            <a:off x="765175" y="365125"/>
+            <a:ext cx="10515600" cy="1325563"/>
+          </a:xfrm>
+          <a:prstGeom prst="rect">
+            <a:avLst/>
+          </a:prstGeom>
+          <a:noFill/>
+          <a:ln w="9525">
+            <a:noFill/>
+            <a:miter lim="800000"/>
+            <a:headEnd/>
+            <a:tailEnd/>
+          </a:ln>
+        </p:spPr>
+        <p:txBody>
+          <a:bodyPr anchor="ctr"/>
+          <a:lstStyle/>
+          <a:p>
+            <a:pPr>
+              <a:lnSpc>
+                <a:spcPct val="90000"/>
+              </a:lnSpc>
+            </a:pPr>
+            <a:r>
+              <a:rPr lang="it-IT" sz="4400">
+                <a:latin typeface="Calibri Light"/>
+              </a:rPr>
+              <a:t>Progetto su Git</a:t>
+            </a:r>
+          </a:p>
+        </p:txBody>
+      </p:sp>
+      <p:pic>
+        <p:nvPicPr>
+          <p:cNvPr id="15365" name="Segnaposto contenuto 3"/>
+          <p:cNvPicPr>
+            <a:picLocks noChangeAspect="1"/>
+          </p:cNvPicPr>
+          <p:nvPr/>
+        </p:nvPicPr>
+        <p:blipFill>
+          <a:blip r:embed="rId2"/>
+          <a:srcRect/>
+          <a:stretch>
+            <a:fillRect/>
+          </a:stretch>
+        </p:blipFill>
+        <p:spPr bwMode="auto">
+          <a:xfrm>
+            <a:off x="0" y="1690688"/>
+            <a:ext cx="12045950" cy="7373937"/>
+          </a:xfrm>
+          <a:prstGeom prst="rect">
+            <a:avLst/>
+          </a:prstGeom>
+          <a:noFill/>
+          <a:ln w="9525">
+            <a:noFill/>
+            <a:miter lim="800000"/>
+            <a:headEnd/>
+            <a:tailEnd/>
+          </a:ln>
+        </p:spPr>
+      </p:pic>
+      <p:sp>
+        <p:nvSpPr>
+          <p:cNvPr id="15366" name="Titolo 1"/>
+          <p:cNvSpPr>
+            <a:spLocks/>
+          </p:cNvSpPr>
+          <p:nvPr/>
+        </p:nvSpPr>
+        <p:spPr bwMode="auto">
+          <a:xfrm>
+            <a:off x="765175" y="365125"/>
+            <a:ext cx="10515600" cy="1325563"/>
+          </a:xfrm>
+          <a:prstGeom prst="rect">
+            <a:avLst/>
+          </a:prstGeom>
+          <a:noFill/>
+          <a:ln w="9525">
+            <a:noFill/>
+            <a:miter lim="800000"/>
+            <a:headEnd/>
+            <a:tailEnd/>
+          </a:ln>
+        </p:spPr>
+        <p:txBody>
+          <a:bodyPr anchor="ctr"/>
+          <a:lstStyle/>
+          <a:p>
+            <a:pPr>
+              <a:lnSpc>
+                <a:spcPct val="90000"/>
+              </a:lnSpc>
+            </a:pPr>
+            <a:r>
+              <a:rPr lang="it-IT" sz="4400">
+                <a:latin typeface="Calibri Light"/>
+              </a:rPr>
+              <a:t>Progetto su Git</a:t>
+            </a:r>
+          </a:p>
+        </p:txBody>
+      </p:sp>
+      <p:pic>
+        <p:nvPicPr>
+          <p:cNvPr id="15367" name="Segnaposto contenuto 3"/>
+          <p:cNvPicPr>
+            <a:picLocks noChangeAspect="1"/>
+          </p:cNvPicPr>
+          <p:nvPr/>
+        </p:nvPicPr>
+        <p:blipFill>
+          <a:blip r:embed="rId2"/>
+          <a:srcRect/>
+          <a:stretch>
+            <a:fillRect/>
+          </a:stretch>
+        </p:blipFill>
+        <p:spPr bwMode="auto">
+          <a:xfrm>
+            <a:off x="0" y="1690688"/>
+            <a:ext cx="12045950" cy="7373937"/>
+          </a:xfrm>
+          <a:prstGeom prst="rect">
+            <a:avLst/>
+          </a:prstGeom>
+          <a:noFill/>
+          <a:ln w="9525">
+            <a:noFill/>
+            <a:miter lim="800000"/>
+            <a:headEnd/>
+            <a:tailEnd/>
+          </a:ln>
+        </p:spPr>
+      </p:pic>
+      <p:sp>
+        <p:nvSpPr>
+          <p:cNvPr id="15368" name="Titolo 1"/>
+          <p:cNvSpPr>
+            <a:spLocks/>
+          </p:cNvSpPr>
+          <p:nvPr/>
+        </p:nvSpPr>
+        <p:spPr bwMode="auto">
+          <a:xfrm>
+            <a:off x="765175" y="365125"/>
+            <a:ext cx="10515600" cy="1325563"/>
+          </a:xfrm>
+          <a:prstGeom prst="rect">
+            <a:avLst/>
+          </a:prstGeom>
+          <a:noFill/>
+          <a:ln w="9525">
+            <a:noFill/>
+            <a:miter lim="800000"/>
+            <a:headEnd/>
+            <a:tailEnd/>
+          </a:ln>
+        </p:spPr>
+        <p:txBody>
+          <a:bodyPr anchor="ctr"/>
+          <a:lstStyle/>
+          <a:p>
+            <a:pPr>
+              <a:lnSpc>
+                <a:spcPct val="90000"/>
+              </a:lnSpc>
+            </a:pPr>
+            <a:r>
+              <a:rPr lang="it-IT" sz="4400">
+                <a:latin typeface="Calibri Light"/>
+              </a:rPr>
+              <a:t>Progetto su Git</a:t>
+            </a:r>
+          </a:p>
+        </p:txBody>
+      </p:sp>
     </p:spTree>
-    <p:extLst>
-      <p:ext uri="{BB962C8B-B14F-4D97-AF65-F5344CB8AC3E}">
-        <p14:creationId xmlns:p14="http://schemas.microsoft.com/office/powerpoint/2010/main" val="1274206009"/>
-      </p:ext>
-    </p:extLst>
   </p:cSld>
   <p:clrMapOvr>
     <a:masterClrMapping/>
   </p:clrMapOvr>
+  <p:timing>
+    <p:tnLst>
+      <p:par>
+        <p:cTn id="1" dur="indefinite" restart="never" nodeType="tmRoot">
+          <p:childTnLst>
+            <p:seq concurrent="1" nextAc="seek">
+              <p:cTn id="2" dur="indefinite" nodeType="mainSeq">
+                <p:childTnLst>
+                  <p:par>
+                    <p:cTn id="3" fill="hold">
+                      <p:stCondLst>
+                        <p:cond delay="indefinite"/>
+                      </p:stCondLst>
+                      <p:childTnLst>
+                        <p:par>
+                          <p:cTn id="4" fill="hold">
+                            <p:stCondLst>
+                              <p:cond delay="0"/>
+                            </p:stCondLst>
+                            <p:childTnLst>
+                              <p:par>
+                                <p:cTn id="5" presetID="8" presetClass="entr" presetSubtype="16" fill="hold" grpId="0" nodeType="clickEffect">
+                                  <p:stCondLst>
+                                    <p:cond delay="0"/>
+                                  </p:stCondLst>
+                                  <p:childTnLst>
+                                    <p:set>
+                                      <p:cBhvr>
+                                        <p:cTn id="6" dur="1" fill="hold">
+                                          <p:stCondLst>
+                                            <p:cond delay="0"/>
+                                          </p:stCondLst>
+                                        </p:cTn>
+                                        <p:tgtEl>
+                                          <p:spTgt spid="15368"/>
+                                        </p:tgtEl>
+                                        <p:attrNameLst>
+                                          <p:attrName>style.visibility</p:attrName>
+                                        </p:attrNameLst>
+                                      </p:cBhvr>
+                                      <p:to>
+                                        <p:strVal val="visible"/>
+                                      </p:to>
+                                    </p:set>
+                                    <p:animEffect transition="in" filter="diamond(in)">
+                                      <p:cBhvr>
+                                        <p:cTn id="7" dur="2000"/>
+                                        <p:tgtEl>
+                                          <p:spTgt spid="15368"/>
+                                        </p:tgtEl>
+                                      </p:cBhvr>
+                                    </p:animEffect>
+                                  </p:childTnLst>
+                                </p:cTn>
+                              </p:par>
+                              <p:par>
+                                <p:cTn id="8" presetID="8" presetClass="entr" presetSubtype="16" fill="hold" nodeType="withEffect">
+                                  <p:stCondLst>
+                                    <p:cond delay="0"/>
+                                  </p:stCondLst>
+                                  <p:childTnLst>
+                                    <p:set>
+                                      <p:cBhvr>
+                                        <p:cTn id="9" dur="1" fill="hold">
+                                          <p:stCondLst>
+                                            <p:cond delay="0"/>
+                                          </p:stCondLst>
+                                        </p:cTn>
+                                        <p:tgtEl>
+                                          <p:spTgt spid="15367"/>
+                                        </p:tgtEl>
+                                        <p:attrNameLst>
+                                          <p:attrName>style.visibility</p:attrName>
+                                        </p:attrNameLst>
+                                      </p:cBhvr>
+                                      <p:to>
+                                        <p:strVal val="visible"/>
+                                      </p:to>
+                                    </p:set>
+                                    <p:animEffect transition="in" filter="diamond(in)">
+                                      <p:cBhvr>
+                                        <p:cTn id="10" dur="2000"/>
+                                        <p:tgtEl>
+                                          <p:spTgt spid="15367"/>
+                                        </p:tgtEl>
+                                      </p:cBhvr>
+                                    </p:animEffect>
+                                  </p:childTnLst>
+                                </p:cTn>
+                              </p:par>
+                            </p:childTnLst>
+                          </p:cTn>
+                        </p:par>
+                      </p:childTnLst>
+                    </p:cTn>
+                  </p:par>
+                </p:childTnLst>
+              </p:cTn>
+              <p:prevCondLst>
+                <p:cond evt="onPrev" delay="0">
+                  <p:tgtEl>
+                    <p:sldTgt/>
+                  </p:tgtEl>
+                </p:cond>
+              </p:prevCondLst>
+              <p:nextCondLst>
+                <p:cond evt="onNext" delay="0">
+                  <p:tgtEl>
+                    <p:sldTgt/>
+                  </p:tgtEl>
+                </p:cond>
+              </p:nextCondLst>
+            </p:seq>
+          </p:childTnLst>
+        </p:cTn>
+      </p:par>
+    </p:tnLst>
+    <p:bldLst>
+      <p:bldP spid="15368" grpId="0"/>
+    </p:bldLst>
+  </p:timing>
 </p:sld>
 </file>
 
@@ -3236,7 +4972,7 @@
       </p:grpSpPr>
       <p:sp>
         <p:nvSpPr>
-          <p:cNvPr id="2" name="Titolo 1"/>
+          <p:cNvPr id="16385" name="Titolo 1"/>
           <p:cNvSpPr>
             <a:spLocks noGrp="1"/>
           </p:cNvSpPr>
@@ -3249,13 +4985,13 @@
           <a:bodyPr/>
           <a:lstStyle/>
           <a:p>
-            <a:endParaRPr lang="it-IT" dirty="0"/>
-          </a:p>
-        </p:txBody>
-      </p:sp>
-      <p:sp>
-        <p:nvSpPr>
-          <p:cNvPr id="3" name="Segnaposto contenuto 2"/>
+            <a:endParaRPr lang="it-IT" smtClean="0"/>
+          </a:p>
+        </p:txBody>
+      </p:sp>
+      <p:sp>
+        <p:nvSpPr>
+          <p:cNvPr id="16386" name="Segnaposto contenuto 2"/>
           <p:cNvSpPr>
             <a:spLocks noGrp="1"/>
           </p:cNvSpPr>
@@ -3269,95 +5005,341 @@
           <a:lstStyle/>
           <a:p>
             <a:r>
-              <a:rPr lang="it-IT" dirty="0" smtClean="0"/>
-              <a:t>L’immagine visualizzata precedentemente mostra la parte di cui si occupa </a:t>
-            </a:r>
-            <a:r>
-              <a:rPr lang="it-IT" dirty="0" err="1" smtClean="0"/>
-              <a:t>git</a:t>
-            </a:r>
-            <a:endParaRPr lang="it-IT" dirty="0"/>
-          </a:p>
-          <a:p>
-            <a:r>
-              <a:rPr lang="it-IT" dirty="0" smtClean="0"/>
-              <a:t>I pallini corrispondono ai </a:t>
-            </a:r>
-            <a:r>
-              <a:rPr lang="it-IT" dirty="0" err="1" smtClean="0"/>
-              <a:t>commit</a:t>
-            </a:r>
-            <a:r>
-              <a:rPr lang="it-IT" dirty="0"/>
-              <a:t> </a:t>
-            </a:r>
-            <a:r>
-              <a:rPr lang="it-IT" dirty="0" smtClean="0"/>
-              <a:t>caricati nei vari </a:t>
-            </a:r>
-            <a:r>
-              <a:rPr lang="it-IT" dirty="0" err="1" smtClean="0"/>
-              <a:t>branch</a:t>
-            </a:r>
-            <a:r>
-              <a:rPr lang="it-IT" dirty="0" smtClean="0"/>
-              <a:t> che sono rappresentati da una linea colorata</a:t>
-            </a:r>
-          </a:p>
-          <a:p>
-            <a:r>
-              <a:rPr lang="it-IT" dirty="0" smtClean="0"/>
-              <a:t>Il master viene copiato ne proprio </a:t>
-            </a:r>
-            <a:r>
-              <a:rPr lang="it-IT" dirty="0" err="1" smtClean="0"/>
-              <a:t>repository</a:t>
-            </a:r>
-            <a:endParaRPr lang="it-IT" dirty="0" smtClean="0"/>
-          </a:p>
-          <a:p>
-            <a:r>
-              <a:rPr lang="it-IT" dirty="0" smtClean="0"/>
-              <a:t>Dove si vede una linea che porta a un </a:t>
-            </a:r>
-            <a:r>
-              <a:rPr lang="it-IT" dirty="0" err="1" smtClean="0"/>
-              <a:t>commit</a:t>
-            </a:r>
-            <a:r>
-              <a:rPr lang="it-IT" dirty="0" smtClean="0"/>
-              <a:t> fuori da un </a:t>
-            </a:r>
-            <a:r>
-              <a:rPr lang="it-IT" dirty="0" err="1" smtClean="0"/>
-              <a:t>branch</a:t>
-            </a:r>
-            <a:r>
-              <a:rPr lang="it-IT" dirty="0" smtClean="0"/>
-              <a:t> e poi ritorna corrisponde a una richiesta di pull(pull </a:t>
-            </a:r>
-            <a:r>
-              <a:rPr lang="it-IT" dirty="0" err="1" smtClean="0"/>
-              <a:t>request</a:t>
-            </a:r>
-            <a:r>
-              <a:rPr lang="it-IT" dirty="0" smtClean="0"/>
-              <a:t>) e viene fatto anche un merge.</a:t>
-            </a:r>
-            <a:endParaRPr lang="it-IT" dirty="0"/>
+              <a:rPr lang="it-IT" smtClean="0"/>
+              <a:t>L’immagine visualizzata precedentemente mostra la parte di cui si occupa git</a:t>
+            </a:r>
+          </a:p>
+          <a:p>
+            <a:r>
+              <a:rPr lang="it-IT" smtClean="0"/>
+              <a:t>I pallini corrispondono ai commit caricati nei vari branch che sono rappresentati da una linea colorata</a:t>
+            </a:r>
+          </a:p>
+          <a:p>
+            <a:r>
+              <a:rPr lang="it-IT" smtClean="0"/>
+              <a:t>Il master viene copiato ne proprio repository</a:t>
+            </a:r>
+          </a:p>
+          <a:p>
+            <a:r>
+              <a:rPr lang="it-IT" smtClean="0"/>
+              <a:t>Dove si vede una linea che porta a un commit fuori da un branch e poi ritorna corrisponde a una richiesta di pull(pull request) e viene fatto anche un merge.</a:t>
+            </a:r>
+          </a:p>
+        </p:txBody>
+      </p:sp>
+      <p:sp>
+        <p:nvSpPr>
+          <p:cNvPr id="16388" name="Titolo 1"/>
+          <p:cNvSpPr>
+            <a:spLocks/>
+          </p:cNvSpPr>
+          <p:nvPr/>
+        </p:nvSpPr>
+        <p:spPr bwMode="auto">
+          <a:xfrm>
+            <a:off x="838200" y="365125"/>
+            <a:ext cx="10515600" cy="1325563"/>
+          </a:xfrm>
+          <a:prstGeom prst="rect">
+            <a:avLst/>
+          </a:prstGeom>
+          <a:noFill/>
+          <a:ln w="9525">
+            <a:noFill/>
+            <a:miter lim="800000"/>
+            <a:headEnd/>
+            <a:tailEnd/>
+          </a:ln>
+        </p:spPr>
+        <p:txBody>
+          <a:bodyPr anchor="ctr"/>
+          <a:lstStyle/>
+          <a:p>
+            <a:pPr>
+              <a:lnSpc>
+                <a:spcPct val="90000"/>
+              </a:lnSpc>
+            </a:pPr>
+            <a:endParaRPr lang="it-IT" sz="4400">
+              <a:latin typeface="Calibri Light"/>
+            </a:endParaRPr>
+          </a:p>
+        </p:txBody>
+      </p:sp>
+      <p:sp>
+        <p:nvSpPr>
+          <p:cNvPr id="16389" name="Segnaposto contenuto 2"/>
+          <p:cNvSpPr>
+            <a:spLocks/>
+          </p:cNvSpPr>
+          <p:nvPr/>
+        </p:nvSpPr>
+        <p:spPr bwMode="auto">
+          <a:xfrm>
+            <a:off x="838200" y="1825625"/>
+            <a:ext cx="10515600" cy="4351338"/>
+          </a:xfrm>
+          <a:prstGeom prst="rect">
+            <a:avLst/>
+          </a:prstGeom>
+          <a:noFill/>
+          <a:ln w="9525">
+            <a:noFill/>
+            <a:miter lim="800000"/>
+            <a:headEnd/>
+            <a:tailEnd/>
+          </a:ln>
+        </p:spPr>
+        <p:txBody>
+          <a:bodyPr/>
+          <a:lstStyle/>
+          <a:p>
+            <a:pPr marL="228600" indent="-228600">
+              <a:lnSpc>
+                <a:spcPct val="90000"/>
+              </a:lnSpc>
+              <a:spcBef>
+                <a:spcPts val="1000"/>
+              </a:spcBef>
+              <a:buFont typeface="Arial" charset="0"/>
+              <a:buChar char="•"/>
+            </a:pPr>
+            <a:r>
+              <a:rPr lang="it-IT" sz="2800">
+                <a:latin typeface="Calibri" pitchFamily="34" charset="0"/>
+              </a:rPr>
+              <a:t>L’immagine visualizzata precedentemente mostra la parte di cui si occupa git</a:t>
+            </a:r>
+          </a:p>
+          <a:p>
+            <a:pPr marL="228600" indent="-228600">
+              <a:lnSpc>
+                <a:spcPct val="90000"/>
+              </a:lnSpc>
+              <a:spcBef>
+                <a:spcPts val="1000"/>
+              </a:spcBef>
+              <a:buFont typeface="Arial" charset="0"/>
+              <a:buChar char="•"/>
+            </a:pPr>
+            <a:r>
+              <a:rPr lang="it-IT" sz="2800">
+                <a:latin typeface="Calibri" pitchFamily="34" charset="0"/>
+              </a:rPr>
+              <a:t>I pallini corrispondono ai commit caricati nei vari branch che sono rappresentati da una linea colorata</a:t>
+            </a:r>
+          </a:p>
+          <a:p>
+            <a:pPr marL="228600" indent="-228600">
+              <a:lnSpc>
+                <a:spcPct val="90000"/>
+              </a:lnSpc>
+              <a:spcBef>
+                <a:spcPts val="1000"/>
+              </a:spcBef>
+              <a:buFont typeface="Arial" charset="0"/>
+              <a:buChar char="•"/>
+            </a:pPr>
+            <a:r>
+              <a:rPr lang="it-IT" sz="2800">
+                <a:latin typeface="Calibri" pitchFamily="34" charset="0"/>
+              </a:rPr>
+              <a:t>Il master viene copiato ne proprio repository</a:t>
+            </a:r>
+          </a:p>
+          <a:p>
+            <a:pPr marL="228600" indent="-228600">
+              <a:lnSpc>
+                <a:spcPct val="90000"/>
+              </a:lnSpc>
+              <a:spcBef>
+                <a:spcPts val="1000"/>
+              </a:spcBef>
+              <a:buFont typeface="Arial" charset="0"/>
+              <a:buChar char="•"/>
+            </a:pPr>
+            <a:r>
+              <a:rPr lang="it-IT" sz="2800">
+                <a:latin typeface="Calibri" pitchFamily="34" charset="0"/>
+              </a:rPr>
+              <a:t>Dove si vede una linea che porta a un commit fuori da un branch e poi ritorna corrisponde a una richiesta di pull(pull request) e viene fatto anche un merge.</a:t>
+            </a:r>
+          </a:p>
+        </p:txBody>
+      </p:sp>
+      <p:sp>
+        <p:nvSpPr>
+          <p:cNvPr id="16390" name="Titolo 1"/>
+          <p:cNvSpPr>
+            <a:spLocks/>
+          </p:cNvSpPr>
+          <p:nvPr/>
+        </p:nvSpPr>
+        <p:spPr bwMode="auto">
+          <a:xfrm>
+            <a:off x="838200" y="365125"/>
+            <a:ext cx="10515600" cy="1325563"/>
+          </a:xfrm>
+          <a:prstGeom prst="rect">
+            <a:avLst/>
+          </a:prstGeom>
+          <a:noFill/>
+          <a:ln w="9525">
+            <a:noFill/>
+            <a:miter lim="800000"/>
+            <a:headEnd/>
+            <a:tailEnd/>
+          </a:ln>
+        </p:spPr>
+        <p:txBody>
+          <a:bodyPr anchor="ctr"/>
+          <a:lstStyle/>
+          <a:p>
+            <a:pPr>
+              <a:lnSpc>
+                <a:spcPct val="90000"/>
+              </a:lnSpc>
+            </a:pPr>
+            <a:endParaRPr lang="it-IT" sz="4400">
+              <a:latin typeface="Calibri Light"/>
+            </a:endParaRPr>
           </a:p>
         </p:txBody>
       </p:sp>
     </p:spTree>
-    <p:extLst>
-      <p:ext uri="{BB962C8B-B14F-4D97-AF65-F5344CB8AC3E}">
-        <p14:creationId xmlns:p14="http://schemas.microsoft.com/office/powerpoint/2010/main" val="3261732704"/>
-      </p:ext>
-    </p:extLst>
   </p:cSld>
   <p:clrMapOvr>
     <a:masterClrMapping/>
   </p:clrMapOvr>
+  <p:timing>
+    <p:tnLst>
+      <p:par>
+        <p:cTn id="1" dur="indefinite" restart="never" nodeType="tmRoot">
+          <p:childTnLst>
+            <p:seq concurrent="1" nextAc="seek">
+              <p:cTn id="2" dur="indefinite" nodeType="mainSeq">
+                <p:childTnLst>
+                  <p:par>
+                    <p:cTn id="3" fill="hold">
+                      <p:stCondLst>
+                        <p:cond delay="indefinite"/>
+                      </p:stCondLst>
+                      <p:childTnLst>
+                        <p:par>
+                          <p:cTn id="4" fill="hold">
+                            <p:stCondLst>
+                              <p:cond delay="0"/>
+                            </p:stCondLst>
+                            <p:childTnLst>
+                              <p:par>
+                                <p:cTn id="5" presetID="5" presetClass="entr" presetSubtype="10" fill="hold" grpId="0" nodeType="clickEffect" nodePh="1">
+                                  <p:stCondLst>
+                                    <p:cond delay="0"/>
+                                  </p:stCondLst>
+                                  <p:endCondLst>
+                                    <p:cond evt="begin" delay="0">
+                                      <p:tn val="5"/>
+                                    </p:cond>
+                                  </p:endCondLst>
+                                  <p:childTnLst>
+                                    <p:set>
+                                      <p:cBhvr>
+                                        <p:cTn id="6" dur="1" fill="hold">
+                                          <p:stCondLst>
+                                            <p:cond delay="0"/>
+                                          </p:stCondLst>
+                                        </p:cTn>
+                                        <p:tgtEl>
+                                          <p:spTgt spid="16390"/>
+                                        </p:tgtEl>
+                                        <p:attrNameLst>
+                                          <p:attrName>style.visibility</p:attrName>
+                                        </p:attrNameLst>
+                                      </p:cBhvr>
+                                      <p:to>
+                                        <p:strVal val="visible"/>
+                                      </p:to>
+                                    </p:set>
+                                    <p:animEffect transition="in" filter="checkerboard(across)">
+                                      <p:cBhvr>
+                                        <p:cTn id="7" dur="500"/>
+                                        <p:tgtEl>
+                                          <p:spTgt spid="16390"/>
+                                        </p:tgtEl>
+                                      </p:cBhvr>
+                                    </p:animEffect>
+                                  </p:childTnLst>
+                                </p:cTn>
+                              </p:par>
+                              <p:par>
+                                <p:cTn id="8" presetID="5" presetClass="entr" presetSubtype="10" fill="hold" grpId="0" nodeType="withEffect">
+                                  <p:stCondLst>
+                                    <p:cond delay="0"/>
+                                  </p:stCondLst>
+                                  <p:childTnLst>
+                                    <p:set>
+                                      <p:cBhvr>
+                                        <p:cTn id="9" dur="1" fill="hold">
+                                          <p:stCondLst>
+                                            <p:cond delay="0"/>
+                                          </p:stCondLst>
+                                        </p:cTn>
+                                        <p:tgtEl>
+                                          <p:spTgt spid="16389"/>
+                                        </p:tgtEl>
+                                        <p:attrNameLst>
+                                          <p:attrName>style.visibility</p:attrName>
+                                        </p:attrNameLst>
+                                      </p:cBhvr>
+                                      <p:to>
+                                        <p:strVal val="visible"/>
+                                      </p:to>
+                                    </p:set>
+                                    <p:animEffect transition="in" filter="checkerboard(across)">
+                                      <p:cBhvr>
+                                        <p:cTn id="10" dur="500"/>
+                                        <p:tgtEl>
+                                          <p:spTgt spid="16389"/>
+                                        </p:tgtEl>
+                                      </p:cBhvr>
+                                    </p:animEffect>
+                                  </p:childTnLst>
+                                </p:cTn>
+                              </p:par>
+                            </p:childTnLst>
+                          </p:cTn>
+                        </p:par>
+                      </p:childTnLst>
+                    </p:cTn>
+                  </p:par>
+                </p:childTnLst>
+              </p:cTn>
+              <p:prevCondLst>
+                <p:cond evt="onPrev" delay="0">
+                  <p:tgtEl>
+                    <p:sldTgt/>
+                  </p:tgtEl>
+                </p:cond>
+              </p:prevCondLst>
+              <p:nextCondLst>
+                <p:cond evt="onNext" delay="0">
+                  <p:tgtEl>
+                    <p:sldTgt/>
+                  </p:tgtEl>
+                </p:cond>
+              </p:nextCondLst>
+            </p:seq>
+          </p:childTnLst>
+        </p:cTn>
+      </p:par>
+    </p:tnLst>
+    <p:bldLst>
+      <p:bldP spid="16389" grpId="0"/>
+      <p:bldP spid="16390" grpId="0"/>
+    </p:bldLst>
+  </p:timing>
 </p:sld>
 </file>
 
@@ -3380,7 +5362,7 @@
       </p:grpSpPr>
       <p:sp>
         <p:nvSpPr>
-          <p:cNvPr id="2" name="Titolo 1"/>
+          <p:cNvPr id="18434" name="Rectangle 2"/>
           <p:cNvSpPr>
             <a:spLocks noGrp="1"/>
           </p:cNvSpPr>
@@ -3393,18 +5375,21 @@
           <a:bodyPr/>
           <a:lstStyle/>
           <a:p>
-            <a:endParaRPr lang="it-IT"/>
-          </a:p>
-        </p:txBody>
-      </p:sp>
-      <p:sp>
-        <p:nvSpPr>
-          <p:cNvPr id="3" name="Segnaposto contenuto 2"/>
-          <p:cNvSpPr>
-            <a:spLocks noGrp="1"/>
-          </p:cNvSpPr>
-          <p:nvPr>
-            <p:ph idx="1"/>
+            <a:r>
+              <a:rPr lang="it-IT" smtClean="0"/>
+              <a:t>Autori:</a:t>
+            </a:r>
+          </a:p>
+        </p:txBody>
+      </p:sp>
+      <p:sp>
+        <p:nvSpPr>
+          <p:cNvPr id="18435" name="Rectangle 3"/>
+          <p:cNvSpPr>
+            <a:spLocks noGrp="1"/>
+          </p:cNvSpPr>
+          <p:nvPr>
+            <p:ph type="body" idx="1"/>
           </p:nvPr>
         </p:nvSpPr>
         <p:spPr/>
@@ -3413,35 +5398,840 @@
           <a:lstStyle/>
           <a:p>
             <a:r>
-              <a:rPr lang="it-IT" dirty="0" smtClean="0"/>
-              <a:t>Dal grafico si può anche dedurre che con </a:t>
-            </a:r>
-            <a:r>
-              <a:rPr lang="it-IT" dirty="0" err="1" smtClean="0"/>
-              <a:t>git</a:t>
-            </a:r>
-            <a:r>
-              <a:rPr lang="it-IT" dirty="0" smtClean="0"/>
-              <a:t> si può ricaricare una vecchia versione del progetto perché magari si vuole trovare una soluzione sfruttando </a:t>
-            </a:r>
-            <a:r>
-              <a:rPr lang="it-IT" smtClean="0"/>
-              <a:t>metodi diversi.</a:t>
-            </a:r>
-            <a:endParaRPr lang="it-IT" dirty="0"/>
+              <a:rPr lang="it-IT" i="1" smtClean="0">
+                <a:latin typeface="Brush Script MT" pitchFamily="66" charset="0"/>
+              </a:rPr>
+              <a:t>Andrea Stefani</a:t>
+            </a:r>
+          </a:p>
+          <a:p>
+            <a:r>
+              <a:rPr lang="it-IT" i="1" smtClean="0">
+                <a:latin typeface="Brush Script MT" pitchFamily="66" charset="0"/>
+              </a:rPr>
+              <a:t>Alessandro Sarzi</a:t>
+            </a:r>
+          </a:p>
+          <a:p>
+            <a:r>
+              <a:rPr lang="it-IT" i="1" smtClean="0">
+                <a:latin typeface="Brush Script MT" pitchFamily="66" charset="0"/>
+              </a:rPr>
+              <a:t>Giovanni Ciotta</a:t>
+            </a:r>
+          </a:p>
+          <a:p>
+            <a:r>
+              <a:rPr lang="it-IT" i="1" smtClean="0">
+                <a:latin typeface="Brush Script MT" pitchFamily="66" charset="0"/>
+              </a:rPr>
+              <a:t>Lorenzo Rossi</a:t>
+            </a:r>
+          </a:p>
+          <a:p>
+            <a:r>
+              <a:rPr lang="it-IT" i="1" smtClean="0">
+                <a:latin typeface="Brush Script MT" pitchFamily="66" charset="0"/>
+              </a:rPr>
+              <a:t>Younes Jamour</a:t>
+            </a:r>
+          </a:p>
+        </p:txBody>
+      </p:sp>
+      <p:sp>
+        <p:nvSpPr>
+          <p:cNvPr id="18436" name="Rectangle 4"/>
+          <p:cNvSpPr>
+            <a:spLocks/>
+          </p:cNvSpPr>
+          <p:nvPr/>
+        </p:nvSpPr>
+        <p:spPr bwMode="auto">
+          <a:xfrm>
+            <a:off x="838200" y="365125"/>
+            <a:ext cx="10515600" cy="1325563"/>
+          </a:xfrm>
+          <a:prstGeom prst="rect">
+            <a:avLst/>
+          </a:prstGeom>
+          <a:noFill/>
+          <a:ln w="9525">
+            <a:noFill/>
+            <a:miter lim="800000"/>
+            <a:headEnd/>
+            <a:tailEnd/>
+          </a:ln>
+        </p:spPr>
+        <p:txBody>
+          <a:bodyPr anchor="ctr"/>
+          <a:lstStyle/>
+          <a:p>
+            <a:pPr>
+              <a:lnSpc>
+                <a:spcPct val="90000"/>
+              </a:lnSpc>
+            </a:pPr>
+            <a:r>
+              <a:rPr lang="it-IT" sz="4400">
+                <a:latin typeface="Calibri Light"/>
+              </a:rPr>
+              <a:t>Autori:</a:t>
+            </a:r>
+          </a:p>
+        </p:txBody>
+      </p:sp>
+      <p:sp>
+        <p:nvSpPr>
+          <p:cNvPr id="18437" name="Rectangle 5"/>
+          <p:cNvSpPr>
+            <a:spLocks/>
+          </p:cNvSpPr>
+          <p:nvPr/>
+        </p:nvSpPr>
+        <p:spPr bwMode="auto">
+          <a:xfrm>
+            <a:off x="838200" y="1825625"/>
+            <a:ext cx="10515600" cy="4351338"/>
+          </a:xfrm>
+          <a:prstGeom prst="rect">
+            <a:avLst/>
+          </a:prstGeom>
+          <a:noFill/>
+          <a:ln w="9525">
+            <a:noFill/>
+            <a:miter lim="800000"/>
+            <a:headEnd/>
+            <a:tailEnd/>
+          </a:ln>
+        </p:spPr>
+        <p:txBody>
+          <a:bodyPr/>
+          <a:lstStyle/>
+          <a:p>
+            <a:pPr marL="228600" indent="-228600">
+              <a:lnSpc>
+                <a:spcPct val="90000"/>
+              </a:lnSpc>
+              <a:spcBef>
+                <a:spcPts val="1000"/>
+              </a:spcBef>
+              <a:buFont typeface="Arial" charset="0"/>
+              <a:buChar char="•"/>
+            </a:pPr>
+            <a:r>
+              <a:rPr lang="it-IT" sz="2800" i="1">
+                <a:latin typeface="Brush Script MT" pitchFamily="66" charset="0"/>
+              </a:rPr>
+              <a:t>Andrea Stefani</a:t>
+            </a:r>
+          </a:p>
+          <a:p>
+            <a:pPr marL="228600" indent="-228600">
+              <a:lnSpc>
+                <a:spcPct val="90000"/>
+              </a:lnSpc>
+              <a:spcBef>
+                <a:spcPts val="1000"/>
+              </a:spcBef>
+              <a:buFont typeface="Arial" charset="0"/>
+              <a:buChar char="•"/>
+            </a:pPr>
+            <a:r>
+              <a:rPr lang="it-IT" sz="2800" i="1">
+                <a:latin typeface="Brush Script MT" pitchFamily="66" charset="0"/>
+              </a:rPr>
+              <a:t>Alessandro Sarzi</a:t>
+            </a:r>
+          </a:p>
+          <a:p>
+            <a:pPr marL="228600" indent="-228600">
+              <a:lnSpc>
+                <a:spcPct val="90000"/>
+              </a:lnSpc>
+              <a:spcBef>
+                <a:spcPts val="1000"/>
+              </a:spcBef>
+              <a:buFont typeface="Arial" charset="0"/>
+              <a:buChar char="•"/>
+            </a:pPr>
+            <a:r>
+              <a:rPr lang="it-IT" sz="2800" i="1">
+                <a:latin typeface="Brush Script MT" pitchFamily="66" charset="0"/>
+              </a:rPr>
+              <a:t>Giovanni Ciotta</a:t>
+            </a:r>
+          </a:p>
+          <a:p>
+            <a:pPr marL="228600" indent="-228600">
+              <a:lnSpc>
+                <a:spcPct val="90000"/>
+              </a:lnSpc>
+              <a:spcBef>
+                <a:spcPts val="1000"/>
+              </a:spcBef>
+              <a:buFont typeface="Arial" charset="0"/>
+              <a:buChar char="•"/>
+            </a:pPr>
+            <a:r>
+              <a:rPr lang="it-IT" sz="2800" i="1">
+                <a:latin typeface="Brush Script MT" pitchFamily="66" charset="0"/>
+              </a:rPr>
+              <a:t>Lorenzo Rossi</a:t>
+            </a:r>
+          </a:p>
+          <a:p>
+            <a:pPr marL="228600" indent="-228600">
+              <a:lnSpc>
+                <a:spcPct val="90000"/>
+              </a:lnSpc>
+              <a:spcBef>
+                <a:spcPts val="1000"/>
+              </a:spcBef>
+              <a:buFont typeface="Arial" charset="0"/>
+              <a:buChar char="•"/>
+            </a:pPr>
+            <a:r>
+              <a:rPr lang="it-IT" sz="2800" i="1">
+                <a:latin typeface="Brush Script MT" pitchFamily="66" charset="0"/>
+              </a:rPr>
+              <a:t>Younes Jamour</a:t>
+            </a:r>
+          </a:p>
+        </p:txBody>
+      </p:sp>
+      <p:sp>
+        <p:nvSpPr>
+          <p:cNvPr id="18438" name="Rectangle 6"/>
+          <p:cNvSpPr>
+            <a:spLocks/>
+          </p:cNvSpPr>
+          <p:nvPr/>
+        </p:nvSpPr>
+        <p:spPr bwMode="auto">
+          <a:xfrm>
+            <a:off x="838200" y="365125"/>
+            <a:ext cx="10515600" cy="1325563"/>
+          </a:xfrm>
+          <a:prstGeom prst="rect">
+            <a:avLst/>
+          </a:prstGeom>
+          <a:noFill/>
+          <a:ln w="9525">
+            <a:noFill/>
+            <a:miter lim="800000"/>
+            <a:headEnd/>
+            <a:tailEnd/>
+          </a:ln>
+        </p:spPr>
+        <p:txBody>
+          <a:bodyPr anchor="ctr"/>
+          <a:lstStyle/>
+          <a:p>
+            <a:pPr>
+              <a:lnSpc>
+                <a:spcPct val="90000"/>
+              </a:lnSpc>
+            </a:pPr>
+            <a:r>
+              <a:rPr lang="it-IT" sz="4400">
+                <a:latin typeface="Calibri Light"/>
+              </a:rPr>
+              <a:t>Autori:</a:t>
+            </a:r>
           </a:p>
         </p:txBody>
       </p:sp>
     </p:spTree>
-    <p:extLst>
-      <p:ext uri="{BB962C8B-B14F-4D97-AF65-F5344CB8AC3E}">
-        <p14:creationId xmlns:p14="http://schemas.microsoft.com/office/powerpoint/2010/main" val="3948257012"/>
-      </p:ext>
-    </p:extLst>
   </p:cSld>
   <p:clrMapOvr>
     <a:masterClrMapping/>
   </p:clrMapOvr>
+  <p:timing>
+    <p:tnLst>
+      <p:par>
+        <p:cTn id="1" dur="indefinite" restart="never" nodeType="tmRoot">
+          <p:childTnLst>
+            <p:seq concurrent="1" nextAc="seek">
+              <p:cTn id="2" dur="indefinite" nodeType="mainSeq">
+                <p:childTnLst>
+                  <p:par>
+                    <p:cTn id="3" fill="hold">
+                      <p:stCondLst>
+                        <p:cond delay="indefinite"/>
+                      </p:stCondLst>
+                      <p:childTnLst>
+                        <p:par>
+                          <p:cTn id="4" fill="hold">
+                            <p:stCondLst>
+                              <p:cond delay="0"/>
+                            </p:stCondLst>
+                            <p:childTnLst>
+                              <p:par>
+                                <p:cTn id="5" presetID="28" presetClass="entr" presetSubtype="0" fill="hold" grpId="0" nodeType="clickEffect">
+                                  <p:stCondLst>
+                                    <p:cond delay="0"/>
+                                  </p:stCondLst>
+                                  <p:childTnLst>
+                                    <p:set>
+                                      <p:cBhvr>
+                                        <p:cTn id="6" dur="1" fill="hold">
+                                          <p:stCondLst>
+                                            <p:cond delay="0"/>
+                                          </p:stCondLst>
+                                        </p:cTn>
+                                        <p:tgtEl>
+                                          <p:spTgt spid="18438"/>
+                                        </p:tgtEl>
+                                        <p:attrNameLst>
+                                          <p:attrName>style.visibility</p:attrName>
+                                        </p:attrNameLst>
+                                      </p:cBhvr>
+                                      <p:to>
+                                        <p:strVal val="visible"/>
+                                      </p:to>
+                                    </p:set>
+                                    <p:anim calcmode="lin" valueType="num">
+                                      <p:cBhvr>
+                                        <p:cTn id="7" dur="15000" fill="hold"/>
+                                        <p:tgtEl>
+                                          <p:spTgt spid="18438"/>
+                                        </p:tgtEl>
+                                        <p:attrNameLst>
+                                          <p:attrName>ppt_x</p:attrName>
+                                        </p:attrNameLst>
+                                      </p:cBhvr>
+                                      <p:tavLst>
+                                        <p:tav tm="0">
+                                          <p:val>
+                                            <p:strVal val="#ppt_x"/>
+                                          </p:val>
+                                        </p:tav>
+                                        <p:tav tm="100000">
+                                          <p:val>
+                                            <p:strVal val="#ppt_x"/>
+                                          </p:val>
+                                        </p:tav>
+                                      </p:tavLst>
+                                    </p:anim>
+                                    <p:anim calcmode="lin" valueType="num">
+                                      <p:cBhvr>
+                                        <p:cTn id="8" dur="15000" fill="hold"/>
+                                        <p:tgtEl>
+                                          <p:spTgt spid="18438"/>
+                                        </p:tgtEl>
+                                        <p:attrNameLst>
+                                          <p:attrName>ppt_y</p:attrName>
+                                        </p:attrNameLst>
+                                      </p:cBhvr>
+                                      <p:tavLst>
+                                        <p:tav tm="0">
+                                          <p:val>
+                                            <p:strVal val="#ppt_y+1"/>
+                                          </p:val>
+                                        </p:tav>
+                                        <p:tav tm="100000">
+                                          <p:val>
+                                            <p:strVal val="#ppt_y-1"/>
+                                          </p:val>
+                                        </p:tav>
+                                      </p:tavLst>
+                                    </p:anim>
+                                  </p:childTnLst>
+                                </p:cTn>
+                              </p:par>
+                              <p:par>
+                                <p:cTn id="9" presetID="28" presetClass="entr" presetSubtype="0" fill="hold" grpId="0" nodeType="withEffect">
+                                  <p:stCondLst>
+                                    <p:cond delay="0"/>
+                                  </p:stCondLst>
+                                  <p:childTnLst>
+                                    <p:set>
+                                      <p:cBhvr>
+                                        <p:cTn id="10" dur="1" fill="hold">
+                                          <p:stCondLst>
+                                            <p:cond delay="0"/>
+                                          </p:stCondLst>
+                                        </p:cTn>
+                                        <p:tgtEl>
+                                          <p:spTgt spid="18437"/>
+                                        </p:tgtEl>
+                                        <p:attrNameLst>
+                                          <p:attrName>style.visibility</p:attrName>
+                                        </p:attrNameLst>
+                                      </p:cBhvr>
+                                      <p:to>
+                                        <p:strVal val="visible"/>
+                                      </p:to>
+                                    </p:set>
+                                    <p:anim calcmode="lin" valueType="num">
+                                      <p:cBhvr>
+                                        <p:cTn id="11" dur="15000" fill="hold"/>
+                                        <p:tgtEl>
+                                          <p:spTgt spid="18437"/>
+                                        </p:tgtEl>
+                                        <p:attrNameLst>
+                                          <p:attrName>ppt_x</p:attrName>
+                                        </p:attrNameLst>
+                                      </p:cBhvr>
+                                      <p:tavLst>
+                                        <p:tav tm="0">
+                                          <p:val>
+                                            <p:strVal val="#ppt_x"/>
+                                          </p:val>
+                                        </p:tav>
+                                        <p:tav tm="100000">
+                                          <p:val>
+                                            <p:strVal val="#ppt_x"/>
+                                          </p:val>
+                                        </p:tav>
+                                      </p:tavLst>
+                                    </p:anim>
+                                    <p:anim calcmode="lin" valueType="num">
+                                      <p:cBhvr>
+                                        <p:cTn id="12" dur="15000" fill="hold"/>
+                                        <p:tgtEl>
+                                          <p:spTgt spid="18437"/>
+                                        </p:tgtEl>
+                                        <p:attrNameLst>
+                                          <p:attrName>ppt_y</p:attrName>
+                                        </p:attrNameLst>
+                                      </p:cBhvr>
+                                      <p:tavLst>
+                                        <p:tav tm="0">
+                                          <p:val>
+                                            <p:strVal val="#ppt_y+1"/>
+                                          </p:val>
+                                        </p:tav>
+                                        <p:tav tm="100000">
+                                          <p:val>
+                                            <p:strVal val="#ppt_y-1"/>
+                                          </p:val>
+                                        </p:tav>
+                                      </p:tavLst>
+                                    </p:anim>
+                                  </p:childTnLst>
+                                </p:cTn>
+                              </p:par>
+                            </p:childTnLst>
+                          </p:cTn>
+                        </p:par>
+                      </p:childTnLst>
+                    </p:cTn>
+                  </p:par>
+                </p:childTnLst>
+              </p:cTn>
+              <p:prevCondLst>
+                <p:cond evt="onPrev" delay="0">
+                  <p:tgtEl>
+                    <p:sldTgt/>
+                  </p:tgtEl>
+                </p:cond>
+              </p:prevCondLst>
+              <p:nextCondLst>
+                <p:cond evt="onNext" delay="0">
+                  <p:tgtEl>
+                    <p:sldTgt/>
+                  </p:tgtEl>
+                </p:cond>
+              </p:nextCondLst>
+            </p:seq>
+          </p:childTnLst>
+        </p:cTn>
+      </p:par>
+    </p:tnLst>
+    <p:bldLst>
+      <p:bldP spid="18437" grpId="0"/>
+      <p:bldP spid="18438" grpId="0"/>
+    </p:bldLst>
+  </p:timing>
+</p:sld>
+</file>
+
+<file path=ppt/slides/slide6.xml><?xml version="1.0" encoding="utf-8"?>
+<p:sld xmlns:a="http://schemas.openxmlformats.org/drawingml/2006/main" xmlns:r="http://schemas.openxmlformats.org/officeDocument/2006/relationships" xmlns:p="http://schemas.openxmlformats.org/presentationml/2006/main">
+  <p:cSld>
+    <p:spTree>
+      <p:nvGrpSpPr>
+        <p:cNvPr id="1" name=""/>
+        <p:cNvGrpSpPr/>
+        <p:nvPr/>
+      </p:nvGrpSpPr>
+      <p:grpSpPr>
+        <a:xfrm>
+          <a:off x="0" y="0"/>
+          <a:ext cx="0" cy="0"/>
+          <a:chOff x="0" y="0"/>
+          <a:chExt cx="0" cy="0"/>
+        </a:xfrm>
+      </p:grpSpPr>
+      <p:sp>
+        <p:nvSpPr>
+          <p:cNvPr id="17409" name="Titolo 1"/>
+          <p:cNvSpPr>
+            <a:spLocks noGrp="1"/>
+          </p:cNvSpPr>
+          <p:nvPr>
+            <p:ph type="title"/>
+          </p:nvPr>
+        </p:nvSpPr>
+        <p:spPr/>
+        <p:txBody>
+          <a:bodyPr/>
+          <a:lstStyle/>
+          <a:p>
+            <a:endParaRPr lang="it-IT" smtClean="0"/>
+          </a:p>
+        </p:txBody>
+      </p:sp>
+      <p:sp>
+        <p:nvSpPr>
+          <p:cNvPr id="17410" name="Segnaposto contenuto 2"/>
+          <p:cNvSpPr>
+            <a:spLocks noGrp="1"/>
+          </p:cNvSpPr>
+          <p:nvPr>
+            <p:ph idx="1"/>
+          </p:nvPr>
+        </p:nvSpPr>
+        <p:spPr/>
+        <p:txBody>
+          <a:bodyPr/>
+          <a:lstStyle/>
+          <a:p>
+            <a:r>
+              <a:rPr lang="it-IT" smtClean="0"/>
+              <a:t>Dal grafico si può anche dedurre che con git si può ricaricare una vecchia versione del progetto perché magari si vuole trovare una soluzione sfruttando metodi diversi.</a:t>
+            </a:r>
+          </a:p>
+        </p:txBody>
+      </p:sp>
+      <p:sp>
+        <p:nvSpPr>
+          <p:cNvPr id="17412" name="Segnaposto contenuto 2"/>
+          <p:cNvSpPr>
+            <a:spLocks/>
+          </p:cNvSpPr>
+          <p:nvPr/>
+        </p:nvSpPr>
+        <p:spPr bwMode="auto">
+          <a:xfrm>
+            <a:off x="838200" y="1825625"/>
+            <a:ext cx="10515600" cy="4351338"/>
+          </a:xfrm>
+          <a:prstGeom prst="rect">
+            <a:avLst/>
+          </a:prstGeom>
+          <a:noFill/>
+          <a:ln w="9525">
+            <a:noFill/>
+            <a:miter lim="800000"/>
+            <a:headEnd/>
+            <a:tailEnd/>
+          </a:ln>
+        </p:spPr>
+        <p:txBody>
+          <a:bodyPr/>
+          <a:lstStyle/>
+          <a:p>
+            <a:pPr marL="228600" indent="-228600">
+              <a:lnSpc>
+                <a:spcPct val="90000"/>
+              </a:lnSpc>
+              <a:spcBef>
+                <a:spcPts val="1000"/>
+              </a:spcBef>
+              <a:buFont typeface="Arial" charset="0"/>
+              <a:buChar char="•"/>
+            </a:pPr>
+            <a:r>
+              <a:rPr lang="it-IT" sz="2800">
+                <a:latin typeface="Calibri" pitchFamily="34" charset="0"/>
+              </a:rPr>
+              <a:t>Dal grafico si può anche dedurre che con git si può ricaricare una vecchia versione del progetto perché magari si vuole trovare una soluzione sfruttando metodi diversi.</a:t>
+            </a:r>
+          </a:p>
+        </p:txBody>
+      </p:sp>
+    </p:spTree>
+  </p:cSld>
+  <p:clrMapOvr>
+    <a:masterClrMapping/>
+  </p:clrMapOvr>
+  <p:timing>
+    <p:tnLst>
+      <p:par>
+        <p:cTn id="1" dur="indefinite" restart="never" nodeType="tmRoot">
+          <p:childTnLst>
+            <p:seq concurrent="1" nextAc="seek">
+              <p:cTn id="2" dur="indefinite" nodeType="mainSeq">
+                <p:childTnLst>
+                  <p:par>
+                    <p:cTn id="3" fill="hold">
+                      <p:stCondLst>
+                        <p:cond delay="indefinite"/>
+                      </p:stCondLst>
+                      <p:childTnLst>
+                        <p:par>
+                          <p:cTn id="4" fill="hold">
+                            <p:stCondLst>
+                              <p:cond delay="0"/>
+                            </p:stCondLst>
+                            <p:childTnLst>
+                              <p:par>
+                                <p:cTn id="5" presetID="25" presetClass="entr" presetSubtype="0" fill="hold" grpId="0" nodeType="clickEffect">
+                                  <p:stCondLst>
+                                    <p:cond delay="0"/>
+                                  </p:stCondLst>
+                                  <p:childTnLst>
+                                    <p:set>
+                                      <p:cBhvr>
+                                        <p:cTn id="6" dur="1" fill="hold">
+                                          <p:stCondLst>
+                                            <p:cond delay="0"/>
+                                          </p:stCondLst>
+                                        </p:cTn>
+                                        <p:tgtEl>
+                                          <p:spTgt spid="17412"/>
+                                        </p:tgtEl>
+                                        <p:attrNameLst>
+                                          <p:attrName>style.visibility</p:attrName>
+                                        </p:attrNameLst>
+                                      </p:cBhvr>
+                                      <p:to>
+                                        <p:strVal val="visible"/>
+                                      </p:to>
+                                    </p:set>
+                                    <p:anim calcmode="lin" valueType="num">
+                                      <p:cBhvr>
+                                        <p:cTn id="7" dur="500" decel="50000" fill="hold">
+                                          <p:stCondLst>
+                                            <p:cond delay="0"/>
+                                          </p:stCondLst>
+                                        </p:cTn>
+                                        <p:tgtEl>
+                                          <p:spTgt spid="17412"/>
+                                        </p:tgtEl>
+                                        <p:attrNameLst>
+                                          <p:attrName>style.rotation</p:attrName>
+                                        </p:attrNameLst>
+                                      </p:cBhvr>
+                                      <p:tavLst>
+                                        <p:tav tm="0">
+                                          <p:val>
+                                            <p:fltVal val="-90"/>
+                                          </p:val>
+                                        </p:tav>
+                                        <p:tav tm="100000">
+                                          <p:val>
+                                            <p:fltVal val="0"/>
+                                          </p:val>
+                                        </p:tav>
+                                      </p:tavLst>
+                                    </p:anim>
+                                    <p:anim calcmode="lin" valueType="num">
+                                      <p:cBhvr>
+                                        <p:cTn id="8" dur="500" decel="50000" fill="hold">
+                                          <p:stCondLst>
+                                            <p:cond delay="0"/>
+                                          </p:stCondLst>
+                                        </p:cTn>
+                                        <p:tgtEl>
+                                          <p:spTgt spid="17412"/>
+                                        </p:tgtEl>
+                                        <p:attrNameLst>
+                                          <p:attrName>ppt_w</p:attrName>
+                                        </p:attrNameLst>
+                                      </p:cBhvr>
+                                      <p:tavLst>
+                                        <p:tav tm="0">
+                                          <p:val>
+                                            <p:strVal val="#ppt_w"/>
+                                          </p:val>
+                                        </p:tav>
+                                        <p:tav tm="100000">
+                                          <p:val>
+                                            <p:strVal val="#ppt_w*.05"/>
+                                          </p:val>
+                                        </p:tav>
+                                      </p:tavLst>
+                                    </p:anim>
+                                    <p:anim calcmode="lin" valueType="num">
+                                      <p:cBhvr>
+                                        <p:cTn id="9" dur="500" accel="50000" fill="hold">
+                                          <p:stCondLst>
+                                            <p:cond delay="500"/>
+                                          </p:stCondLst>
+                                        </p:cTn>
+                                        <p:tgtEl>
+                                          <p:spTgt spid="17412"/>
+                                        </p:tgtEl>
+                                        <p:attrNameLst>
+                                          <p:attrName>ppt_w</p:attrName>
+                                        </p:attrNameLst>
+                                      </p:cBhvr>
+                                      <p:tavLst>
+                                        <p:tav tm="0">
+                                          <p:val>
+                                            <p:strVal val="#ppt_w*.05"/>
+                                          </p:val>
+                                        </p:tav>
+                                        <p:tav tm="100000">
+                                          <p:val>
+                                            <p:strVal val="#ppt_w"/>
+                                          </p:val>
+                                        </p:tav>
+                                      </p:tavLst>
+                                    </p:anim>
+                                    <p:anim calcmode="lin" valueType="num">
+                                      <p:cBhvr>
+                                        <p:cTn id="10" dur="1000" fill="hold"/>
+                                        <p:tgtEl>
+                                          <p:spTgt spid="17412"/>
+                                        </p:tgtEl>
+                                        <p:attrNameLst>
+                                          <p:attrName>ppt_h</p:attrName>
+                                        </p:attrNameLst>
+                                      </p:cBhvr>
+                                      <p:tavLst>
+                                        <p:tav tm="0">
+                                          <p:val>
+                                            <p:strVal val="#ppt_h"/>
+                                          </p:val>
+                                        </p:tav>
+                                        <p:tav tm="100000">
+                                          <p:val>
+                                            <p:strVal val="#ppt_h"/>
+                                          </p:val>
+                                        </p:tav>
+                                      </p:tavLst>
+                                    </p:anim>
+                                    <p:anim calcmode="lin" valueType="num">
+                                      <p:cBhvr>
+                                        <p:cTn id="11" dur="500" decel="50000" fill="hold">
+                                          <p:stCondLst>
+                                            <p:cond delay="0"/>
+                                          </p:stCondLst>
+                                        </p:cTn>
+                                        <p:tgtEl>
+                                          <p:spTgt spid="17412"/>
+                                        </p:tgtEl>
+                                        <p:attrNameLst>
+                                          <p:attrName>ppt_x</p:attrName>
+                                        </p:attrNameLst>
+                                      </p:cBhvr>
+                                      <p:tavLst>
+                                        <p:tav tm="0">
+                                          <p:val>
+                                            <p:strVal val="#ppt_x+.4"/>
+                                          </p:val>
+                                        </p:tav>
+                                        <p:tav tm="100000">
+                                          <p:val>
+                                            <p:strVal val="#ppt_x"/>
+                                          </p:val>
+                                        </p:tav>
+                                      </p:tavLst>
+                                    </p:anim>
+                                    <p:anim calcmode="lin" valueType="num">
+                                      <p:cBhvr>
+                                        <p:cTn id="12" dur="500" decel="50000" fill="hold">
+                                          <p:stCondLst>
+                                            <p:cond delay="0"/>
+                                          </p:stCondLst>
+                                        </p:cTn>
+                                        <p:tgtEl>
+                                          <p:spTgt spid="17412"/>
+                                        </p:tgtEl>
+                                        <p:attrNameLst>
+                                          <p:attrName>ppt_y</p:attrName>
+                                        </p:attrNameLst>
+                                      </p:cBhvr>
+                                      <p:tavLst>
+                                        <p:tav tm="0">
+                                          <p:val>
+                                            <p:strVal val="#ppt_y-.2"/>
+                                          </p:val>
+                                        </p:tav>
+                                        <p:tav tm="100000">
+                                          <p:val>
+                                            <p:strVal val="#ppt_y+.1"/>
+                                          </p:val>
+                                        </p:tav>
+                                      </p:tavLst>
+                                    </p:anim>
+                                    <p:anim calcmode="lin" valueType="num">
+                                      <p:cBhvr>
+                                        <p:cTn id="13" dur="500" accel="50000" fill="hold">
+                                          <p:stCondLst>
+                                            <p:cond delay="500"/>
+                                          </p:stCondLst>
+                                        </p:cTn>
+                                        <p:tgtEl>
+                                          <p:spTgt spid="17412"/>
+                                        </p:tgtEl>
+                                        <p:attrNameLst>
+                                          <p:attrName>ppt_y</p:attrName>
+                                        </p:attrNameLst>
+                                      </p:cBhvr>
+                                      <p:tavLst>
+                                        <p:tav tm="0">
+                                          <p:val>
+                                            <p:strVal val="#ppt_y+.1"/>
+                                          </p:val>
+                                        </p:tav>
+                                        <p:tav tm="100000">
+                                          <p:val>
+                                            <p:strVal val="#ppt_y"/>
+                                          </p:val>
+                                        </p:tav>
+                                      </p:tavLst>
+                                    </p:anim>
+                                    <p:animEffect transition="in" filter="fade">
+                                      <p:cBhvr>
+                                        <p:cTn id="14" dur="1000" decel="50000">
+                                          <p:stCondLst>
+                                            <p:cond delay="0"/>
+                                          </p:stCondLst>
+                                        </p:cTn>
+                                        <p:tgtEl>
+                                          <p:spTgt spid="17412"/>
+                                        </p:tgtEl>
+                                      </p:cBhvr>
+                                    </p:animEffect>
+                                  </p:childTnLst>
+                                </p:cTn>
+                              </p:par>
+                            </p:childTnLst>
+                          </p:cTn>
+                        </p:par>
+                      </p:childTnLst>
+                    </p:cTn>
+                  </p:par>
+                </p:childTnLst>
+              </p:cTn>
+              <p:prevCondLst>
+                <p:cond evt="onPrev" delay="0">
+                  <p:tgtEl>
+                    <p:sldTgt/>
+                  </p:tgtEl>
+                </p:cond>
+              </p:prevCondLst>
+              <p:nextCondLst>
+                <p:cond evt="onNext" delay="0">
+                  <p:tgtEl>
+                    <p:sldTgt/>
+                  </p:tgtEl>
+                </p:cond>
+              </p:nextCondLst>
+            </p:seq>
+          </p:childTnLst>
+        </p:cTn>
+      </p:par>
+    </p:tnLst>
+    <p:bldLst>
+      <p:bldP spid="17412" grpId="0"/>
+    </p:bldLst>
+  </p:timing>
 </p:sld>
 </file>
 
@@ -3488,7 +6278,7 @@
     </a:clrScheme>
     <a:fontScheme name="Office">
       <a:majorFont>
-        <a:latin typeface="Calibri Light" panose="020F0302020204030204"/>
+        <a:latin typeface="Calibri Light"/>
         <a:ea typeface=""/>
         <a:cs typeface=""/>
         <a:font script="Jpan" typeface="ＭＳ Ｐゴシック"/>
@@ -3523,7 +6313,7 @@
         <a:font script="Geor" typeface="Sylfaen"/>
       </a:majorFont>
       <a:minorFont>
-        <a:latin typeface="Calibri" panose="020F0502020204030204"/>
+        <a:latin typeface="Calibri"/>
         <a:ea typeface=""/>
         <a:cs typeface=""/>
         <a:font script="Jpan" typeface="ＭＳ Ｐゴシック"/>
@@ -3700,7 +6490,7 @@
   <a:extraClrSchemeLst/>
   <a:extLst>
     <a:ext uri="{05A4C25C-085E-4340-85A3-A5531E510DB2}">
-      <thm15:themeFamily xmlns:thm15="http://schemas.microsoft.com/office/thememl/2012/main" name="Office Theme" id="{62F939B6-93AF-4DB8-9C6B-D6C7DFDC589F}" vid="{4A3C46E8-61CC-4603-A589-7422A47A8E4A}"/>
+      <thm15:themeFamily xmlns="" xmlns:thm15="http://schemas.microsoft.com/office/thememl/2012/main" name="Office Theme" id="{62F939B6-93AF-4DB8-9C6B-D6C7DFDC589F}" vid="{4A3C46E8-61CC-4603-A589-7422A47A8E4A}"/>
     </a:ext>
   </a:extLst>
 </a:theme>

</xml_diff>